<commit_message>
Milestone 5 dox with beta posters.  fix if you want.
</commit_message>
<xml_diff>
--- a/src/Docs/posters/PublicView_CMS_Poster.pptx
+++ b/src/Docs/posters/PublicView_CMS_Poster.pptx
@@ -13,92 +13,122 @@
     <a:defPPr>
       <a:defRPr lang="en-US"/>
     </a:defPPr>
-    <a:lvl1pPr marL="0" algn="l" defTabSz="3762024" rtl="0" eaLnBrk="1" latinLnBrk="0" hangingPunct="1">
+    <a:lvl1pPr algn="l" defTabSz="3760788" rtl="0" fontAlgn="base">
+      <a:spcBef>
+        <a:spcPct val="0"/>
+      </a:spcBef>
+      <a:spcAft>
+        <a:spcPct val="0"/>
+      </a:spcAft>
       <a:defRPr sz="7400" kern="1200">
         <a:solidFill>
           <a:schemeClr val="tx1"/>
         </a:solidFill>
-        <a:latin typeface="+mn-lt"/>
+        <a:latin typeface="Arial" charset="0"/>
         <a:ea typeface="+mn-ea"/>
         <a:cs typeface="+mn-cs"/>
       </a:defRPr>
     </a:lvl1pPr>
-    <a:lvl2pPr marL="1881012" algn="l" defTabSz="3762024" rtl="0" eaLnBrk="1" latinLnBrk="0" hangingPunct="1">
+    <a:lvl2pPr marL="1879600" indent="-1422400" algn="l" defTabSz="3760788" rtl="0" fontAlgn="base">
+      <a:spcBef>
+        <a:spcPct val="0"/>
+      </a:spcBef>
+      <a:spcAft>
+        <a:spcPct val="0"/>
+      </a:spcAft>
       <a:defRPr sz="7400" kern="1200">
         <a:solidFill>
           <a:schemeClr val="tx1"/>
         </a:solidFill>
-        <a:latin typeface="+mn-lt"/>
+        <a:latin typeface="Arial" charset="0"/>
         <a:ea typeface="+mn-ea"/>
         <a:cs typeface="+mn-cs"/>
       </a:defRPr>
     </a:lvl2pPr>
-    <a:lvl3pPr marL="3762024" algn="l" defTabSz="3762024" rtl="0" eaLnBrk="1" latinLnBrk="0" hangingPunct="1">
+    <a:lvl3pPr marL="3760788" indent="-2846388" algn="l" defTabSz="3760788" rtl="0" fontAlgn="base">
+      <a:spcBef>
+        <a:spcPct val="0"/>
+      </a:spcBef>
+      <a:spcAft>
+        <a:spcPct val="0"/>
+      </a:spcAft>
       <a:defRPr sz="7400" kern="1200">
         <a:solidFill>
           <a:schemeClr val="tx1"/>
         </a:solidFill>
-        <a:latin typeface="+mn-lt"/>
+        <a:latin typeface="Arial" charset="0"/>
         <a:ea typeface="+mn-ea"/>
         <a:cs typeface="+mn-cs"/>
       </a:defRPr>
     </a:lvl3pPr>
-    <a:lvl4pPr marL="5643037" algn="l" defTabSz="3762024" rtl="0" eaLnBrk="1" latinLnBrk="0" hangingPunct="1">
+    <a:lvl4pPr marL="5641975" indent="-4270375" algn="l" defTabSz="3760788" rtl="0" fontAlgn="base">
+      <a:spcBef>
+        <a:spcPct val="0"/>
+      </a:spcBef>
+      <a:spcAft>
+        <a:spcPct val="0"/>
+      </a:spcAft>
       <a:defRPr sz="7400" kern="1200">
         <a:solidFill>
           <a:schemeClr val="tx1"/>
         </a:solidFill>
-        <a:latin typeface="+mn-lt"/>
+        <a:latin typeface="Arial" charset="0"/>
         <a:ea typeface="+mn-ea"/>
         <a:cs typeface="+mn-cs"/>
       </a:defRPr>
     </a:lvl4pPr>
-    <a:lvl5pPr marL="7524049" algn="l" defTabSz="3762024" rtl="0" eaLnBrk="1" latinLnBrk="0" hangingPunct="1">
+    <a:lvl5pPr marL="7523163" indent="-5694363" algn="l" defTabSz="3760788" rtl="0" fontAlgn="base">
+      <a:spcBef>
+        <a:spcPct val="0"/>
+      </a:spcBef>
+      <a:spcAft>
+        <a:spcPct val="0"/>
+      </a:spcAft>
       <a:defRPr sz="7400" kern="1200">
         <a:solidFill>
           <a:schemeClr val="tx1"/>
         </a:solidFill>
-        <a:latin typeface="+mn-lt"/>
+        <a:latin typeface="Arial" charset="0"/>
         <a:ea typeface="+mn-ea"/>
         <a:cs typeface="+mn-cs"/>
       </a:defRPr>
     </a:lvl5pPr>
-    <a:lvl6pPr marL="9405061" algn="l" defTabSz="3762024" rtl="0" eaLnBrk="1" latinLnBrk="0" hangingPunct="1">
+    <a:lvl6pPr marL="2286000" algn="l" defTabSz="914400" rtl="0" eaLnBrk="1" latinLnBrk="0" hangingPunct="1">
       <a:defRPr sz="7400" kern="1200">
         <a:solidFill>
           <a:schemeClr val="tx1"/>
         </a:solidFill>
-        <a:latin typeface="+mn-lt"/>
+        <a:latin typeface="Arial" charset="0"/>
         <a:ea typeface="+mn-ea"/>
         <a:cs typeface="+mn-cs"/>
       </a:defRPr>
     </a:lvl6pPr>
-    <a:lvl7pPr marL="11286073" algn="l" defTabSz="3762024" rtl="0" eaLnBrk="1" latinLnBrk="0" hangingPunct="1">
+    <a:lvl7pPr marL="2743200" algn="l" defTabSz="914400" rtl="0" eaLnBrk="1" latinLnBrk="0" hangingPunct="1">
       <a:defRPr sz="7400" kern="1200">
         <a:solidFill>
           <a:schemeClr val="tx1"/>
         </a:solidFill>
-        <a:latin typeface="+mn-lt"/>
+        <a:latin typeface="Arial" charset="0"/>
         <a:ea typeface="+mn-ea"/>
         <a:cs typeface="+mn-cs"/>
       </a:defRPr>
     </a:lvl7pPr>
-    <a:lvl8pPr marL="13167086" algn="l" defTabSz="3762024" rtl="0" eaLnBrk="1" latinLnBrk="0" hangingPunct="1">
+    <a:lvl8pPr marL="3200400" algn="l" defTabSz="914400" rtl="0" eaLnBrk="1" latinLnBrk="0" hangingPunct="1">
       <a:defRPr sz="7400" kern="1200">
         <a:solidFill>
           <a:schemeClr val="tx1"/>
         </a:solidFill>
-        <a:latin typeface="+mn-lt"/>
+        <a:latin typeface="Arial" charset="0"/>
         <a:ea typeface="+mn-ea"/>
         <a:cs typeface="+mn-cs"/>
       </a:defRPr>
     </a:lvl8pPr>
-    <a:lvl9pPr marL="15048098" algn="l" defTabSz="3762024" rtl="0" eaLnBrk="1" latinLnBrk="0" hangingPunct="1">
+    <a:lvl9pPr marL="3657600" algn="l" defTabSz="914400" rtl="0" eaLnBrk="1" latinLnBrk="0" hangingPunct="1">
       <a:defRPr sz="7400" kern="1200">
         <a:solidFill>
           <a:schemeClr val="tx1"/>
         </a:solidFill>
-        <a:latin typeface="+mn-lt"/>
+        <a:latin typeface="Arial" charset="0"/>
         <a:ea typeface="+mn-ea"/>
         <a:cs typeface="+mn-cs"/>
       </a:defRPr>
@@ -284,12 +314,21 @@
         <p:spPr/>
         <p:txBody>
           <a:bodyPr/>
-          <a:lstStyle/>
-          <a:p>
-            <a:fld id="{1C1D3833-2B13-464A-BD94-E3167CFC0F67}" type="datetimeFigureOut">
-              <a:rPr lang="en-US" smtClean="0"/>
-              <a:pPr/>
-              <a:t>4/13/2011</a:t>
+          <a:lstStyle>
+            <a:lvl1pPr>
+              <a:defRPr/>
+            </a:lvl1pPr>
+          </a:lstStyle>
+          <a:p>
+            <a:pPr>
+              <a:defRPr/>
+            </a:pPr>
+            <a:fld id="{D0511A6D-C502-475D-BB61-124C34CF5E46}" type="datetimeFigureOut">
+              <a:rPr lang="en-US"/>
+              <a:pPr>
+                <a:defRPr/>
+              </a:pPr>
+              <a:t>4/14/2011</a:t>
             </a:fld>
             <a:endParaRPr lang="en-US"/>
           </a:p>
@@ -308,8 +347,15 @@
         <p:spPr/>
         <p:txBody>
           <a:bodyPr/>
-          <a:lstStyle/>
-          <a:p>
+          <a:lstStyle>
+            <a:lvl1pPr>
+              <a:defRPr/>
+            </a:lvl1pPr>
+          </a:lstStyle>
+          <a:p>
+            <a:pPr>
+              <a:defRPr/>
+            </a:pPr>
             <a:endParaRPr lang="en-US"/>
           </a:p>
         </p:txBody>
@@ -327,11 +373,20 @@
         <p:spPr/>
         <p:txBody>
           <a:bodyPr/>
-          <a:lstStyle/>
-          <a:p>
-            <a:fld id="{153C754B-F51C-49DF-8C65-A0BCDDAA7DC5}" type="slidenum">
-              <a:rPr lang="en-US" smtClean="0"/>
-              <a:pPr/>
+          <a:lstStyle>
+            <a:lvl1pPr>
+              <a:defRPr/>
+            </a:lvl1pPr>
+          </a:lstStyle>
+          <a:p>
+            <a:pPr>
+              <a:defRPr/>
+            </a:pPr>
+            <a:fld id="{058DC51B-09BD-4126-A877-4289AD589030}" type="slidenum">
+              <a:rPr lang="en-US"/>
+              <a:pPr>
+                <a:defRPr/>
+              </a:pPr>
               <a:t>‹#›</a:t>
             </a:fld>
             <a:endParaRPr lang="en-US"/>
@@ -451,12 +506,21 @@
         <p:spPr/>
         <p:txBody>
           <a:bodyPr/>
-          <a:lstStyle/>
-          <a:p>
-            <a:fld id="{1C1D3833-2B13-464A-BD94-E3167CFC0F67}" type="datetimeFigureOut">
-              <a:rPr lang="en-US" smtClean="0"/>
-              <a:pPr/>
-              <a:t>4/13/2011</a:t>
+          <a:lstStyle>
+            <a:lvl1pPr>
+              <a:defRPr/>
+            </a:lvl1pPr>
+          </a:lstStyle>
+          <a:p>
+            <a:pPr>
+              <a:defRPr/>
+            </a:pPr>
+            <a:fld id="{7863705A-D0E4-43B0-86CE-0010AE308EB9}" type="datetimeFigureOut">
+              <a:rPr lang="en-US"/>
+              <a:pPr>
+                <a:defRPr/>
+              </a:pPr>
+              <a:t>4/14/2011</a:t>
             </a:fld>
             <a:endParaRPr lang="en-US"/>
           </a:p>
@@ -475,8 +539,15 @@
         <p:spPr/>
         <p:txBody>
           <a:bodyPr/>
-          <a:lstStyle/>
-          <a:p>
+          <a:lstStyle>
+            <a:lvl1pPr>
+              <a:defRPr/>
+            </a:lvl1pPr>
+          </a:lstStyle>
+          <a:p>
+            <a:pPr>
+              <a:defRPr/>
+            </a:pPr>
             <a:endParaRPr lang="en-US"/>
           </a:p>
         </p:txBody>
@@ -494,11 +565,20 @@
         <p:spPr/>
         <p:txBody>
           <a:bodyPr/>
-          <a:lstStyle/>
-          <a:p>
-            <a:fld id="{153C754B-F51C-49DF-8C65-A0BCDDAA7DC5}" type="slidenum">
-              <a:rPr lang="en-US" smtClean="0"/>
-              <a:pPr/>
+          <a:lstStyle>
+            <a:lvl1pPr>
+              <a:defRPr/>
+            </a:lvl1pPr>
+          </a:lstStyle>
+          <a:p>
+            <a:pPr>
+              <a:defRPr/>
+            </a:pPr>
+            <a:fld id="{16168F5D-6689-4212-972D-667487B023B7}" type="slidenum">
+              <a:rPr lang="en-US"/>
+              <a:pPr>
+                <a:defRPr/>
+              </a:pPr>
               <a:t>‹#›</a:t>
             </a:fld>
             <a:endParaRPr lang="en-US"/>
@@ -628,12 +708,21 @@
         <p:spPr/>
         <p:txBody>
           <a:bodyPr/>
-          <a:lstStyle/>
-          <a:p>
-            <a:fld id="{1C1D3833-2B13-464A-BD94-E3167CFC0F67}" type="datetimeFigureOut">
-              <a:rPr lang="en-US" smtClean="0"/>
-              <a:pPr/>
-              <a:t>4/13/2011</a:t>
+          <a:lstStyle>
+            <a:lvl1pPr>
+              <a:defRPr/>
+            </a:lvl1pPr>
+          </a:lstStyle>
+          <a:p>
+            <a:pPr>
+              <a:defRPr/>
+            </a:pPr>
+            <a:fld id="{33E31A53-09AA-4D42-A40A-BC99E4F29B48}" type="datetimeFigureOut">
+              <a:rPr lang="en-US"/>
+              <a:pPr>
+                <a:defRPr/>
+              </a:pPr>
+              <a:t>4/14/2011</a:t>
             </a:fld>
             <a:endParaRPr lang="en-US"/>
           </a:p>
@@ -652,8 +741,15 @@
         <p:spPr/>
         <p:txBody>
           <a:bodyPr/>
-          <a:lstStyle/>
-          <a:p>
+          <a:lstStyle>
+            <a:lvl1pPr>
+              <a:defRPr/>
+            </a:lvl1pPr>
+          </a:lstStyle>
+          <a:p>
+            <a:pPr>
+              <a:defRPr/>
+            </a:pPr>
             <a:endParaRPr lang="en-US"/>
           </a:p>
         </p:txBody>
@@ -671,11 +767,20 @@
         <p:spPr/>
         <p:txBody>
           <a:bodyPr/>
-          <a:lstStyle/>
-          <a:p>
-            <a:fld id="{153C754B-F51C-49DF-8C65-A0BCDDAA7DC5}" type="slidenum">
-              <a:rPr lang="en-US" smtClean="0"/>
-              <a:pPr/>
+          <a:lstStyle>
+            <a:lvl1pPr>
+              <a:defRPr/>
+            </a:lvl1pPr>
+          </a:lstStyle>
+          <a:p>
+            <a:pPr>
+              <a:defRPr/>
+            </a:pPr>
+            <a:fld id="{C648C146-BBB8-4F20-9009-832B4DC8434C}" type="slidenum">
+              <a:rPr lang="en-US"/>
+              <a:pPr>
+                <a:defRPr/>
+              </a:pPr>
               <a:t>‹#›</a:t>
             </a:fld>
             <a:endParaRPr lang="en-US"/>
@@ -795,12 +900,21 @@
         <p:spPr/>
         <p:txBody>
           <a:bodyPr/>
-          <a:lstStyle/>
-          <a:p>
-            <a:fld id="{1C1D3833-2B13-464A-BD94-E3167CFC0F67}" type="datetimeFigureOut">
-              <a:rPr lang="en-US" smtClean="0"/>
-              <a:pPr/>
-              <a:t>4/13/2011</a:t>
+          <a:lstStyle>
+            <a:lvl1pPr>
+              <a:defRPr/>
+            </a:lvl1pPr>
+          </a:lstStyle>
+          <a:p>
+            <a:pPr>
+              <a:defRPr/>
+            </a:pPr>
+            <a:fld id="{C34786C0-74B9-4354-AF4E-781CAC405FB1}" type="datetimeFigureOut">
+              <a:rPr lang="en-US"/>
+              <a:pPr>
+                <a:defRPr/>
+              </a:pPr>
+              <a:t>4/14/2011</a:t>
             </a:fld>
             <a:endParaRPr lang="en-US"/>
           </a:p>
@@ -819,8 +933,15 @@
         <p:spPr/>
         <p:txBody>
           <a:bodyPr/>
-          <a:lstStyle/>
-          <a:p>
+          <a:lstStyle>
+            <a:lvl1pPr>
+              <a:defRPr/>
+            </a:lvl1pPr>
+          </a:lstStyle>
+          <a:p>
+            <a:pPr>
+              <a:defRPr/>
+            </a:pPr>
             <a:endParaRPr lang="en-US"/>
           </a:p>
         </p:txBody>
@@ -838,11 +959,20 @@
         <p:spPr/>
         <p:txBody>
           <a:bodyPr/>
-          <a:lstStyle/>
-          <a:p>
-            <a:fld id="{153C754B-F51C-49DF-8C65-A0BCDDAA7DC5}" type="slidenum">
-              <a:rPr lang="en-US" smtClean="0"/>
-              <a:pPr/>
+          <a:lstStyle>
+            <a:lvl1pPr>
+              <a:defRPr/>
+            </a:lvl1pPr>
+          </a:lstStyle>
+          <a:p>
+            <a:pPr>
+              <a:defRPr/>
+            </a:pPr>
+            <a:fld id="{4DE95F09-820A-41DF-B70A-06916C864514}" type="slidenum">
+              <a:rPr lang="en-US"/>
+              <a:pPr>
+                <a:defRPr/>
+              </a:pPr>
               <a:t>‹#›</a:t>
             </a:fld>
             <a:endParaRPr lang="en-US"/>
@@ -1038,12 +1168,21 @@
         <p:spPr/>
         <p:txBody>
           <a:bodyPr/>
-          <a:lstStyle/>
-          <a:p>
-            <a:fld id="{1C1D3833-2B13-464A-BD94-E3167CFC0F67}" type="datetimeFigureOut">
-              <a:rPr lang="en-US" smtClean="0"/>
-              <a:pPr/>
-              <a:t>4/13/2011</a:t>
+          <a:lstStyle>
+            <a:lvl1pPr>
+              <a:defRPr/>
+            </a:lvl1pPr>
+          </a:lstStyle>
+          <a:p>
+            <a:pPr>
+              <a:defRPr/>
+            </a:pPr>
+            <a:fld id="{98ECFA08-A539-4D23-AA7F-F73C0BE96281}" type="datetimeFigureOut">
+              <a:rPr lang="en-US"/>
+              <a:pPr>
+                <a:defRPr/>
+              </a:pPr>
+              <a:t>4/14/2011</a:t>
             </a:fld>
             <a:endParaRPr lang="en-US"/>
           </a:p>
@@ -1062,8 +1201,15 @@
         <p:spPr/>
         <p:txBody>
           <a:bodyPr/>
-          <a:lstStyle/>
-          <a:p>
+          <a:lstStyle>
+            <a:lvl1pPr>
+              <a:defRPr/>
+            </a:lvl1pPr>
+          </a:lstStyle>
+          <a:p>
+            <a:pPr>
+              <a:defRPr/>
+            </a:pPr>
             <a:endParaRPr lang="en-US"/>
           </a:p>
         </p:txBody>
@@ -1081,11 +1227,20 @@
         <p:spPr/>
         <p:txBody>
           <a:bodyPr/>
-          <a:lstStyle/>
-          <a:p>
-            <a:fld id="{153C754B-F51C-49DF-8C65-A0BCDDAA7DC5}" type="slidenum">
-              <a:rPr lang="en-US" smtClean="0"/>
-              <a:pPr/>
+          <a:lstStyle>
+            <a:lvl1pPr>
+              <a:defRPr/>
+            </a:lvl1pPr>
+          </a:lstStyle>
+          <a:p>
+            <a:pPr>
+              <a:defRPr/>
+            </a:pPr>
+            <a:fld id="{4D530F0E-6999-4FFA-9CDA-E3FDEB234A35}" type="slidenum">
+              <a:rPr lang="en-US"/>
+              <a:pPr>
+                <a:defRPr/>
+              </a:pPr>
               <a:t>‹#›</a:t>
             </a:fld>
             <a:endParaRPr lang="en-US"/>
@@ -1312,7 +1467,7 @@
       </p:sp>
       <p:sp>
         <p:nvSpPr>
-          <p:cNvPr id="5" name="Date Placeholder 4"/>
+          <p:cNvPr id="5" name="Date Placeholder 3"/>
           <p:cNvSpPr>
             <a:spLocks noGrp="1"/>
           </p:cNvSpPr>
@@ -1323,12 +1478,21 @@
         <p:spPr/>
         <p:txBody>
           <a:bodyPr/>
-          <a:lstStyle/>
-          <a:p>
-            <a:fld id="{1C1D3833-2B13-464A-BD94-E3167CFC0F67}" type="datetimeFigureOut">
-              <a:rPr lang="en-US" smtClean="0"/>
-              <a:pPr/>
-              <a:t>4/13/2011</a:t>
+          <a:lstStyle>
+            <a:lvl1pPr>
+              <a:defRPr/>
+            </a:lvl1pPr>
+          </a:lstStyle>
+          <a:p>
+            <a:pPr>
+              <a:defRPr/>
+            </a:pPr>
+            <a:fld id="{41EF1BFD-228B-4CDC-863B-EC1DB0F7DCBB}" type="datetimeFigureOut">
+              <a:rPr lang="en-US"/>
+              <a:pPr>
+                <a:defRPr/>
+              </a:pPr>
+              <a:t>4/14/2011</a:t>
             </a:fld>
             <a:endParaRPr lang="en-US"/>
           </a:p>
@@ -1336,7 +1500,7 @@
       </p:sp>
       <p:sp>
         <p:nvSpPr>
-          <p:cNvPr id="6" name="Footer Placeholder 5"/>
+          <p:cNvPr id="6" name="Footer Placeholder 4"/>
           <p:cNvSpPr>
             <a:spLocks noGrp="1"/>
           </p:cNvSpPr>
@@ -1347,15 +1511,22 @@
         <p:spPr/>
         <p:txBody>
           <a:bodyPr/>
-          <a:lstStyle/>
-          <a:p>
-            <a:endParaRPr lang="en-US"/>
-          </a:p>
-        </p:txBody>
-      </p:sp>
-      <p:sp>
-        <p:nvSpPr>
-          <p:cNvPr id="7" name="Slide Number Placeholder 6"/>
+          <a:lstStyle>
+            <a:lvl1pPr>
+              <a:defRPr/>
+            </a:lvl1pPr>
+          </a:lstStyle>
+          <a:p>
+            <a:pPr>
+              <a:defRPr/>
+            </a:pPr>
+            <a:endParaRPr lang="en-US"/>
+          </a:p>
+        </p:txBody>
+      </p:sp>
+      <p:sp>
+        <p:nvSpPr>
+          <p:cNvPr id="7" name="Slide Number Placeholder 5"/>
           <p:cNvSpPr>
             <a:spLocks noGrp="1"/>
           </p:cNvSpPr>
@@ -1366,11 +1537,20 @@
         <p:spPr/>
         <p:txBody>
           <a:bodyPr/>
-          <a:lstStyle/>
-          <a:p>
-            <a:fld id="{153C754B-F51C-49DF-8C65-A0BCDDAA7DC5}" type="slidenum">
-              <a:rPr lang="en-US" smtClean="0"/>
-              <a:pPr/>
+          <a:lstStyle>
+            <a:lvl1pPr>
+              <a:defRPr/>
+            </a:lvl1pPr>
+          </a:lstStyle>
+          <a:p>
+            <a:pPr>
+              <a:defRPr/>
+            </a:pPr>
+            <a:fld id="{7A2C9D58-F85E-453F-A31D-6A8295C34B5C}" type="slidenum">
+              <a:rPr lang="en-US"/>
+              <a:pPr>
+                <a:defRPr/>
+              </a:pPr>
               <a:t>‹#›</a:t>
             </a:fld>
             <a:endParaRPr lang="en-US"/>
@@ -1731,7 +1911,7 @@
       </p:sp>
       <p:sp>
         <p:nvSpPr>
-          <p:cNvPr id="7" name="Date Placeholder 6"/>
+          <p:cNvPr id="7" name="Date Placeholder 3"/>
           <p:cNvSpPr>
             <a:spLocks noGrp="1"/>
           </p:cNvSpPr>
@@ -1742,12 +1922,21 @@
         <p:spPr/>
         <p:txBody>
           <a:bodyPr/>
-          <a:lstStyle/>
-          <a:p>
-            <a:fld id="{1C1D3833-2B13-464A-BD94-E3167CFC0F67}" type="datetimeFigureOut">
-              <a:rPr lang="en-US" smtClean="0"/>
-              <a:pPr/>
-              <a:t>4/13/2011</a:t>
+          <a:lstStyle>
+            <a:lvl1pPr>
+              <a:defRPr/>
+            </a:lvl1pPr>
+          </a:lstStyle>
+          <a:p>
+            <a:pPr>
+              <a:defRPr/>
+            </a:pPr>
+            <a:fld id="{2E85CEE9-4244-4836-9A4E-7F725BED2651}" type="datetimeFigureOut">
+              <a:rPr lang="en-US"/>
+              <a:pPr>
+                <a:defRPr/>
+              </a:pPr>
+              <a:t>4/14/2011</a:t>
             </a:fld>
             <a:endParaRPr lang="en-US"/>
           </a:p>
@@ -1755,7 +1944,7 @@
       </p:sp>
       <p:sp>
         <p:nvSpPr>
-          <p:cNvPr id="8" name="Footer Placeholder 7"/>
+          <p:cNvPr id="8" name="Footer Placeholder 4"/>
           <p:cNvSpPr>
             <a:spLocks noGrp="1"/>
           </p:cNvSpPr>
@@ -1766,15 +1955,22 @@
         <p:spPr/>
         <p:txBody>
           <a:bodyPr/>
-          <a:lstStyle/>
-          <a:p>
-            <a:endParaRPr lang="en-US"/>
-          </a:p>
-        </p:txBody>
-      </p:sp>
-      <p:sp>
-        <p:nvSpPr>
-          <p:cNvPr id="9" name="Slide Number Placeholder 8"/>
+          <a:lstStyle>
+            <a:lvl1pPr>
+              <a:defRPr/>
+            </a:lvl1pPr>
+          </a:lstStyle>
+          <a:p>
+            <a:pPr>
+              <a:defRPr/>
+            </a:pPr>
+            <a:endParaRPr lang="en-US"/>
+          </a:p>
+        </p:txBody>
+      </p:sp>
+      <p:sp>
+        <p:nvSpPr>
+          <p:cNvPr id="9" name="Slide Number Placeholder 5"/>
           <p:cNvSpPr>
             <a:spLocks noGrp="1"/>
           </p:cNvSpPr>
@@ -1785,11 +1981,20 @@
         <p:spPr/>
         <p:txBody>
           <a:bodyPr/>
-          <a:lstStyle/>
-          <a:p>
-            <a:fld id="{153C754B-F51C-49DF-8C65-A0BCDDAA7DC5}" type="slidenum">
-              <a:rPr lang="en-US" smtClean="0"/>
-              <a:pPr/>
+          <a:lstStyle>
+            <a:lvl1pPr>
+              <a:defRPr/>
+            </a:lvl1pPr>
+          </a:lstStyle>
+          <a:p>
+            <a:pPr>
+              <a:defRPr/>
+            </a:pPr>
+            <a:fld id="{525DF7C9-CCAF-48E2-B0F9-DCD3531718A7}" type="slidenum">
+              <a:rPr lang="en-US"/>
+              <a:pPr>
+                <a:defRPr/>
+              </a:pPr>
               <a:t>‹#›</a:t>
             </a:fld>
             <a:endParaRPr lang="en-US"/>
@@ -1846,7 +2051,7 @@
       </p:sp>
       <p:sp>
         <p:nvSpPr>
-          <p:cNvPr id="3" name="Date Placeholder 2"/>
+          <p:cNvPr id="3" name="Date Placeholder 3"/>
           <p:cNvSpPr>
             <a:spLocks noGrp="1"/>
           </p:cNvSpPr>
@@ -1857,12 +2062,21 @@
         <p:spPr/>
         <p:txBody>
           <a:bodyPr/>
-          <a:lstStyle/>
-          <a:p>
-            <a:fld id="{1C1D3833-2B13-464A-BD94-E3167CFC0F67}" type="datetimeFigureOut">
-              <a:rPr lang="en-US" smtClean="0"/>
-              <a:pPr/>
-              <a:t>4/13/2011</a:t>
+          <a:lstStyle>
+            <a:lvl1pPr>
+              <a:defRPr/>
+            </a:lvl1pPr>
+          </a:lstStyle>
+          <a:p>
+            <a:pPr>
+              <a:defRPr/>
+            </a:pPr>
+            <a:fld id="{AB0C1F1B-BC9B-4162-83C4-F8992628D312}" type="datetimeFigureOut">
+              <a:rPr lang="en-US"/>
+              <a:pPr>
+                <a:defRPr/>
+              </a:pPr>
+              <a:t>4/14/2011</a:t>
             </a:fld>
             <a:endParaRPr lang="en-US"/>
           </a:p>
@@ -1870,7 +2084,7 @@
       </p:sp>
       <p:sp>
         <p:nvSpPr>
-          <p:cNvPr id="4" name="Footer Placeholder 3"/>
+          <p:cNvPr id="4" name="Footer Placeholder 4"/>
           <p:cNvSpPr>
             <a:spLocks noGrp="1"/>
           </p:cNvSpPr>
@@ -1881,15 +2095,22 @@
         <p:spPr/>
         <p:txBody>
           <a:bodyPr/>
-          <a:lstStyle/>
-          <a:p>
-            <a:endParaRPr lang="en-US"/>
-          </a:p>
-        </p:txBody>
-      </p:sp>
-      <p:sp>
-        <p:nvSpPr>
-          <p:cNvPr id="5" name="Slide Number Placeholder 4"/>
+          <a:lstStyle>
+            <a:lvl1pPr>
+              <a:defRPr/>
+            </a:lvl1pPr>
+          </a:lstStyle>
+          <a:p>
+            <a:pPr>
+              <a:defRPr/>
+            </a:pPr>
+            <a:endParaRPr lang="en-US"/>
+          </a:p>
+        </p:txBody>
+      </p:sp>
+      <p:sp>
+        <p:nvSpPr>
+          <p:cNvPr id="5" name="Slide Number Placeholder 5"/>
           <p:cNvSpPr>
             <a:spLocks noGrp="1"/>
           </p:cNvSpPr>
@@ -1900,11 +2121,20 @@
         <p:spPr/>
         <p:txBody>
           <a:bodyPr/>
-          <a:lstStyle/>
-          <a:p>
-            <a:fld id="{153C754B-F51C-49DF-8C65-A0BCDDAA7DC5}" type="slidenum">
-              <a:rPr lang="en-US" smtClean="0"/>
-              <a:pPr/>
+          <a:lstStyle>
+            <a:lvl1pPr>
+              <a:defRPr/>
+            </a:lvl1pPr>
+          </a:lstStyle>
+          <a:p>
+            <a:pPr>
+              <a:defRPr/>
+            </a:pPr>
+            <a:fld id="{6841F057-B3E0-42C1-B9A7-7B7A961156A5}" type="slidenum">
+              <a:rPr lang="en-US"/>
+              <a:pPr>
+                <a:defRPr/>
+              </a:pPr>
               <a:t>‹#›</a:t>
             </a:fld>
             <a:endParaRPr lang="en-US"/>
@@ -1938,7 +2168,7 @@
       </p:grpSpPr>
       <p:sp>
         <p:nvSpPr>
-          <p:cNvPr id="2" name="Date Placeholder 1"/>
+          <p:cNvPr id="2" name="Date Placeholder 3"/>
           <p:cNvSpPr>
             <a:spLocks noGrp="1"/>
           </p:cNvSpPr>
@@ -1949,12 +2179,21 @@
         <p:spPr/>
         <p:txBody>
           <a:bodyPr/>
-          <a:lstStyle/>
-          <a:p>
-            <a:fld id="{1C1D3833-2B13-464A-BD94-E3167CFC0F67}" type="datetimeFigureOut">
-              <a:rPr lang="en-US" smtClean="0"/>
-              <a:pPr/>
-              <a:t>4/13/2011</a:t>
+          <a:lstStyle>
+            <a:lvl1pPr>
+              <a:defRPr/>
+            </a:lvl1pPr>
+          </a:lstStyle>
+          <a:p>
+            <a:pPr>
+              <a:defRPr/>
+            </a:pPr>
+            <a:fld id="{98D0C1D5-DB40-4CDE-8203-8C1E9A0D87C4}" type="datetimeFigureOut">
+              <a:rPr lang="en-US"/>
+              <a:pPr>
+                <a:defRPr/>
+              </a:pPr>
+              <a:t>4/14/2011</a:t>
             </a:fld>
             <a:endParaRPr lang="en-US"/>
           </a:p>
@@ -1962,7 +2201,7 @@
       </p:sp>
       <p:sp>
         <p:nvSpPr>
-          <p:cNvPr id="3" name="Footer Placeholder 2"/>
+          <p:cNvPr id="3" name="Footer Placeholder 4"/>
           <p:cNvSpPr>
             <a:spLocks noGrp="1"/>
           </p:cNvSpPr>
@@ -1973,15 +2212,22 @@
         <p:spPr/>
         <p:txBody>
           <a:bodyPr/>
-          <a:lstStyle/>
-          <a:p>
-            <a:endParaRPr lang="en-US"/>
-          </a:p>
-        </p:txBody>
-      </p:sp>
-      <p:sp>
-        <p:nvSpPr>
-          <p:cNvPr id="4" name="Slide Number Placeholder 3"/>
+          <a:lstStyle>
+            <a:lvl1pPr>
+              <a:defRPr/>
+            </a:lvl1pPr>
+          </a:lstStyle>
+          <a:p>
+            <a:pPr>
+              <a:defRPr/>
+            </a:pPr>
+            <a:endParaRPr lang="en-US"/>
+          </a:p>
+        </p:txBody>
+      </p:sp>
+      <p:sp>
+        <p:nvSpPr>
+          <p:cNvPr id="4" name="Slide Number Placeholder 5"/>
           <p:cNvSpPr>
             <a:spLocks noGrp="1"/>
           </p:cNvSpPr>
@@ -1992,11 +2238,20 @@
         <p:spPr/>
         <p:txBody>
           <a:bodyPr/>
-          <a:lstStyle/>
-          <a:p>
-            <a:fld id="{153C754B-F51C-49DF-8C65-A0BCDDAA7DC5}" type="slidenum">
-              <a:rPr lang="en-US" smtClean="0"/>
-              <a:pPr/>
+          <a:lstStyle>
+            <a:lvl1pPr>
+              <a:defRPr/>
+            </a:lvl1pPr>
+          </a:lstStyle>
+          <a:p>
+            <a:pPr>
+              <a:defRPr/>
+            </a:pPr>
+            <a:fld id="{5FA00DAC-C9EA-4DAC-87B3-4EE158A64B50}" type="slidenum">
+              <a:rPr lang="en-US"/>
+              <a:pPr>
+                <a:defRPr/>
+              </a:pPr>
               <a:t>‹#›</a:t>
             </a:fld>
             <a:endParaRPr lang="en-US"/>
@@ -2212,7 +2467,7 @@
       </p:sp>
       <p:sp>
         <p:nvSpPr>
-          <p:cNvPr id="5" name="Date Placeholder 4"/>
+          <p:cNvPr id="5" name="Date Placeholder 3"/>
           <p:cNvSpPr>
             <a:spLocks noGrp="1"/>
           </p:cNvSpPr>
@@ -2223,12 +2478,21 @@
         <p:spPr/>
         <p:txBody>
           <a:bodyPr/>
-          <a:lstStyle/>
-          <a:p>
-            <a:fld id="{1C1D3833-2B13-464A-BD94-E3167CFC0F67}" type="datetimeFigureOut">
-              <a:rPr lang="en-US" smtClean="0"/>
-              <a:pPr/>
-              <a:t>4/13/2011</a:t>
+          <a:lstStyle>
+            <a:lvl1pPr>
+              <a:defRPr/>
+            </a:lvl1pPr>
+          </a:lstStyle>
+          <a:p>
+            <a:pPr>
+              <a:defRPr/>
+            </a:pPr>
+            <a:fld id="{F6662508-8CA3-4588-BCAA-77CB42234F0F}" type="datetimeFigureOut">
+              <a:rPr lang="en-US"/>
+              <a:pPr>
+                <a:defRPr/>
+              </a:pPr>
+              <a:t>4/14/2011</a:t>
             </a:fld>
             <a:endParaRPr lang="en-US"/>
           </a:p>
@@ -2236,7 +2500,7 @@
       </p:sp>
       <p:sp>
         <p:nvSpPr>
-          <p:cNvPr id="6" name="Footer Placeholder 5"/>
+          <p:cNvPr id="6" name="Footer Placeholder 4"/>
           <p:cNvSpPr>
             <a:spLocks noGrp="1"/>
           </p:cNvSpPr>
@@ -2247,15 +2511,22 @@
         <p:spPr/>
         <p:txBody>
           <a:bodyPr/>
-          <a:lstStyle/>
-          <a:p>
-            <a:endParaRPr lang="en-US"/>
-          </a:p>
-        </p:txBody>
-      </p:sp>
-      <p:sp>
-        <p:nvSpPr>
-          <p:cNvPr id="7" name="Slide Number Placeholder 6"/>
+          <a:lstStyle>
+            <a:lvl1pPr>
+              <a:defRPr/>
+            </a:lvl1pPr>
+          </a:lstStyle>
+          <a:p>
+            <a:pPr>
+              <a:defRPr/>
+            </a:pPr>
+            <a:endParaRPr lang="en-US"/>
+          </a:p>
+        </p:txBody>
+      </p:sp>
+      <p:sp>
+        <p:nvSpPr>
+          <p:cNvPr id="7" name="Slide Number Placeholder 5"/>
           <p:cNvSpPr>
             <a:spLocks noGrp="1"/>
           </p:cNvSpPr>
@@ -2266,11 +2537,20 @@
         <p:spPr/>
         <p:txBody>
           <a:bodyPr/>
-          <a:lstStyle/>
-          <a:p>
-            <a:fld id="{153C754B-F51C-49DF-8C65-A0BCDDAA7DC5}" type="slidenum">
-              <a:rPr lang="en-US" smtClean="0"/>
-              <a:pPr/>
+          <a:lstStyle>
+            <a:lvl1pPr>
+              <a:defRPr/>
+            </a:lvl1pPr>
+          </a:lstStyle>
+          <a:p>
+            <a:pPr>
+              <a:defRPr/>
+            </a:pPr>
+            <a:fld id="{1A379130-FF6E-49A1-9B72-7F03E4FAADFE}" type="slidenum">
+              <a:rPr lang="en-US"/>
+              <a:pPr>
+                <a:defRPr/>
+              </a:pPr>
               <a:t>‹#›</a:t>
             </a:fld>
             <a:endParaRPr lang="en-US"/>
@@ -2351,7 +2631,9 @@
           </a:xfrm>
         </p:spPr>
         <p:txBody>
-          <a:bodyPr/>
+          <a:bodyPr rtlCol="0">
+            <a:normAutofit/>
+          </a:bodyPr>
           <a:lstStyle>
             <a:lvl1pPr marL="0" indent="0">
               <a:buNone/>
@@ -2391,7 +2673,8 @@
             </a:lvl9pPr>
           </a:lstStyle>
           <a:p>
-            <a:endParaRPr lang="en-US"/>
+            <a:pPr lvl="0"/>
+            <a:endParaRPr lang="en-US" noProof="0"/>
           </a:p>
         </p:txBody>
       </p:sp>
@@ -2462,7 +2745,7 @@
       </p:sp>
       <p:sp>
         <p:nvSpPr>
-          <p:cNvPr id="5" name="Date Placeholder 4"/>
+          <p:cNvPr id="5" name="Date Placeholder 3"/>
           <p:cNvSpPr>
             <a:spLocks noGrp="1"/>
           </p:cNvSpPr>
@@ -2473,12 +2756,21 @@
         <p:spPr/>
         <p:txBody>
           <a:bodyPr/>
-          <a:lstStyle/>
-          <a:p>
-            <a:fld id="{1C1D3833-2B13-464A-BD94-E3167CFC0F67}" type="datetimeFigureOut">
-              <a:rPr lang="en-US" smtClean="0"/>
-              <a:pPr/>
-              <a:t>4/13/2011</a:t>
+          <a:lstStyle>
+            <a:lvl1pPr>
+              <a:defRPr/>
+            </a:lvl1pPr>
+          </a:lstStyle>
+          <a:p>
+            <a:pPr>
+              <a:defRPr/>
+            </a:pPr>
+            <a:fld id="{A2FDB2B7-C5BF-464A-A17D-4107C6C0D5EE}" type="datetimeFigureOut">
+              <a:rPr lang="en-US"/>
+              <a:pPr>
+                <a:defRPr/>
+              </a:pPr>
+              <a:t>4/14/2011</a:t>
             </a:fld>
             <a:endParaRPr lang="en-US"/>
           </a:p>
@@ -2486,7 +2778,7 @@
       </p:sp>
       <p:sp>
         <p:nvSpPr>
-          <p:cNvPr id="6" name="Footer Placeholder 5"/>
+          <p:cNvPr id="6" name="Footer Placeholder 4"/>
           <p:cNvSpPr>
             <a:spLocks noGrp="1"/>
           </p:cNvSpPr>
@@ -2497,15 +2789,22 @@
         <p:spPr/>
         <p:txBody>
           <a:bodyPr/>
-          <a:lstStyle/>
-          <a:p>
-            <a:endParaRPr lang="en-US"/>
-          </a:p>
-        </p:txBody>
-      </p:sp>
-      <p:sp>
-        <p:nvSpPr>
-          <p:cNvPr id="7" name="Slide Number Placeholder 6"/>
+          <a:lstStyle>
+            <a:lvl1pPr>
+              <a:defRPr/>
+            </a:lvl1pPr>
+          </a:lstStyle>
+          <a:p>
+            <a:pPr>
+              <a:defRPr/>
+            </a:pPr>
+            <a:endParaRPr lang="en-US"/>
+          </a:p>
+        </p:txBody>
+      </p:sp>
+      <p:sp>
+        <p:nvSpPr>
+          <p:cNvPr id="7" name="Slide Number Placeholder 5"/>
           <p:cNvSpPr>
             <a:spLocks noGrp="1"/>
           </p:cNvSpPr>
@@ -2516,11 +2815,20 @@
         <p:spPr/>
         <p:txBody>
           <a:bodyPr/>
-          <a:lstStyle/>
-          <a:p>
-            <a:fld id="{153C754B-F51C-49DF-8C65-A0BCDDAA7DC5}" type="slidenum">
-              <a:rPr lang="en-US" smtClean="0"/>
-              <a:pPr/>
+          <a:lstStyle>
+            <a:lvl1pPr>
+              <a:defRPr/>
+            </a:lvl1pPr>
+          </a:lstStyle>
+          <a:p>
+            <a:pPr>
+              <a:defRPr/>
+            </a:pPr>
+            <a:fld id="{A59A5F61-FA2F-4531-81DB-9B48FA870272}" type="slidenum">
+              <a:rPr lang="en-US"/>
+              <a:pPr>
+                <a:defRPr/>
+              </a:pPr>
               <a:t>‹#›</a:t>
             </a:fld>
             <a:endParaRPr lang="en-US"/>
@@ -2559,7 +2867,7 @@
       </p:grpSpPr>
       <p:sp>
         <p:nvSpPr>
-          <p:cNvPr id="2" name="Title Placeholder 1"/>
+          <p:cNvPr id="1026" name="Title Placeholder 1"/>
           <p:cNvSpPr>
             <a:spLocks noGrp="1"/>
           </p:cNvSpPr>
@@ -2567,105 +2875,176 @@
             <p:ph type="title"/>
           </p:nvPr>
         </p:nvSpPr>
-        <p:spPr>
+        <p:spPr bwMode="auto">
           <a:xfrm>
-            <a:off x="1828800" y="1171789"/>
+            <a:off x="1828800" y="1171575"/>
             <a:ext cx="32918400" cy="4876800"/>
           </a:xfrm>
           <a:prstGeom prst="rect">
             <a:avLst/>
           </a:prstGeom>
+          <a:noFill/>
+          <a:ln w="9525">
+            <a:noFill/>
+            <a:miter lim="800000"/>
+            <a:headEnd/>
+            <a:tailEnd/>
+          </a:ln>
         </p:spPr>
         <p:txBody>
-          <a:bodyPr vert="horz" lIns="376202" tIns="188101" rIns="376202" bIns="188101" rtlCol="0" anchor="ctr">
-            <a:normAutofit/>
+          <a:bodyPr vert="horz" wrap="square" lIns="376202" tIns="188101" rIns="376202" bIns="188101" numCol="1" anchor="ctr" anchorCtr="0" compatLnSpc="1">
+            <a:prstTxWarp prst="textNoShape">
+              <a:avLst/>
+            </a:prstTxWarp>
           </a:bodyPr>
           <a:lstStyle/>
           <a:p>
+            <a:pPr lvl="0"/>
             <a:r>
               <a:rPr lang="en-US" smtClean="0"/>
               <a:t>Click to edit Master title style</a:t>
             </a:r>
-            <a:endParaRPr lang="en-US"/>
-          </a:p>
-        </p:txBody>
-      </p:sp>
-      <p:sp>
-        <p:nvSpPr>
-          <p:cNvPr id="3" name="Text Placeholder 2"/>
+          </a:p>
+        </p:txBody>
+      </p:sp>
+      <p:sp>
+        <p:nvSpPr>
+          <p:cNvPr id="1027" name="Text Placeholder 2"/>
           <p:cNvSpPr>
             <a:spLocks noGrp="1"/>
           </p:cNvSpPr>
           <p:nvPr>
             <p:ph type="body" idx="1"/>
+          </p:nvPr>
+        </p:nvSpPr>
+        <p:spPr bwMode="auto">
+          <a:xfrm>
+            <a:off x="1828800" y="6827838"/>
+            <a:ext cx="32918400" cy="19310350"/>
+          </a:xfrm>
+          <a:prstGeom prst="rect">
+            <a:avLst/>
+          </a:prstGeom>
+          <a:noFill/>
+          <a:ln w="9525">
+            <a:noFill/>
+            <a:miter lim="800000"/>
+            <a:headEnd/>
+            <a:tailEnd/>
+          </a:ln>
+        </p:spPr>
+        <p:txBody>
+          <a:bodyPr vert="horz" wrap="square" lIns="376202" tIns="188101" rIns="376202" bIns="188101" numCol="1" anchor="t" anchorCtr="0" compatLnSpc="1">
+            <a:prstTxWarp prst="textNoShape">
+              <a:avLst/>
+            </a:prstTxWarp>
+          </a:bodyPr>
+          <a:lstStyle/>
+          <a:p>
+            <a:pPr lvl="0"/>
+            <a:r>
+              <a:rPr lang="en-US" smtClean="0"/>
+              <a:t>Click to edit Master text styles</a:t>
+            </a:r>
+          </a:p>
+          <a:p>
+            <a:pPr lvl="1"/>
+            <a:r>
+              <a:rPr lang="en-US" smtClean="0"/>
+              <a:t>Second level</a:t>
+            </a:r>
+          </a:p>
+          <a:p>
+            <a:pPr lvl="2"/>
+            <a:r>
+              <a:rPr lang="en-US" smtClean="0"/>
+              <a:t>Third level</a:t>
+            </a:r>
+          </a:p>
+          <a:p>
+            <a:pPr lvl="3"/>
+            <a:r>
+              <a:rPr lang="en-US" smtClean="0"/>
+              <a:t>Fourth level</a:t>
+            </a:r>
+          </a:p>
+          <a:p>
+            <a:pPr lvl="4"/>
+            <a:r>
+              <a:rPr lang="en-US" smtClean="0"/>
+              <a:t>Fifth level</a:t>
+            </a:r>
+          </a:p>
+        </p:txBody>
+      </p:sp>
+      <p:sp>
+        <p:nvSpPr>
+          <p:cNvPr id="4" name="Date Placeholder 3"/>
+          <p:cNvSpPr>
+            <a:spLocks noGrp="1"/>
+          </p:cNvSpPr>
+          <p:nvPr>
+            <p:ph type="dt" sz="half" idx="2"/>
           </p:nvPr>
         </p:nvSpPr>
         <p:spPr>
           <a:xfrm>
-            <a:off x="1828800" y="6827522"/>
-            <a:ext cx="32918400" cy="19310775"/>
+            <a:off x="1828800" y="27120850"/>
+            <a:ext cx="8534400" cy="1557338"/>
           </a:xfrm>
           <a:prstGeom prst="rect">
             <a:avLst/>
           </a:prstGeom>
         </p:spPr>
         <p:txBody>
-          <a:bodyPr vert="horz" lIns="376202" tIns="188101" rIns="376202" bIns="188101" rtlCol="0">
-            <a:normAutofit/>
-          </a:bodyPr>
-          <a:lstStyle/>
-          <a:p>
-            <a:pPr lvl="0"/>
-            <a:r>
-              <a:rPr lang="en-US" smtClean="0"/>
-              <a:t>Click to edit Master text styles</a:t>
-            </a:r>
-          </a:p>
-          <a:p>
-            <a:pPr lvl="1"/>
-            <a:r>
-              <a:rPr lang="en-US" smtClean="0"/>
-              <a:t>Second level</a:t>
-            </a:r>
-          </a:p>
-          <a:p>
-            <a:pPr lvl="2"/>
-            <a:r>
-              <a:rPr lang="en-US" smtClean="0"/>
-              <a:t>Third level</a:t>
-            </a:r>
-          </a:p>
-          <a:p>
-            <a:pPr lvl="3"/>
-            <a:r>
-              <a:rPr lang="en-US" smtClean="0"/>
-              <a:t>Fourth level</a:t>
-            </a:r>
-          </a:p>
-          <a:p>
-            <a:pPr lvl="4"/>
-            <a:r>
-              <a:rPr lang="en-US" smtClean="0"/>
-              <a:t>Fifth level</a:t>
-            </a:r>
-            <a:endParaRPr lang="en-US"/>
-          </a:p>
-        </p:txBody>
-      </p:sp>
-      <p:sp>
-        <p:nvSpPr>
-          <p:cNvPr id="4" name="Date Placeholder 3"/>
-          <p:cNvSpPr>
-            <a:spLocks noGrp="1"/>
-          </p:cNvSpPr>
-          <p:nvPr>
-            <p:ph type="dt" sz="half" idx="2"/>
+          <a:bodyPr vert="horz" lIns="376202" tIns="188101" rIns="376202" bIns="188101" rtlCol="0" anchor="ctr"/>
+          <a:lstStyle>
+            <a:lvl1pPr algn="l" defTabSz="3762024" fontAlgn="auto">
+              <a:spcBef>
+                <a:spcPts val="0"/>
+              </a:spcBef>
+              <a:spcAft>
+                <a:spcPts val="0"/>
+              </a:spcAft>
+              <a:defRPr sz="4900" smtClean="0">
+                <a:solidFill>
+                  <a:schemeClr val="tx1">
+                    <a:tint val="75000"/>
+                  </a:schemeClr>
+                </a:solidFill>
+                <a:latin typeface="+mn-lt"/>
+              </a:defRPr>
+            </a:lvl1pPr>
+          </a:lstStyle>
+          <a:p>
+            <a:pPr>
+              <a:defRPr/>
+            </a:pPr>
+            <a:fld id="{8179535B-C779-4D0E-A692-662930A9232F}" type="datetimeFigureOut">
+              <a:rPr lang="en-US"/>
+              <a:pPr>
+                <a:defRPr/>
+              </a:pPr>
+              <a:t>4/14/2011</a:t>
+            </a:fld>
+            <a:endParaRPr lang="en-US"/>
+          </a:p>
+        </p:txBody>
+      </p:sp>
+      <p:sp>
+        <p:nvSpPr>
+          <p:cNvPr id="5" name="Footer Placeholder 4"/>
+          <p:cNvSpPr>
+            <a:spLocks noGrp="1"/>
+          </p:cNvSpPr>
+          <p:nvPr>
+            <p:ph type="ftr" sz="quarter" idx="3"/>
           </p:nvPr>
         </p:nvSpPr>
         <p:spPr>
           <a:xfrm>
-            <a:off x="1828800" y="27120429"/>
-            <a:ext cx="8534400" cy="1557867"/>
+            <a:off x="12496800" y="27120850"/>
+            <a:ext cx="11582400" cy="1557338"/>
           </a:xfrm>
           <a:prstGeom prst="rect">
             <a:avLst/>
@@ -2674,40 +3053,45 @@
         <p:txBody>
           <a:bodyPr vert="horz" lIns="376202" tIns="188101" rIns="376202" bIns="188101" rtlCol="0" anchor="ctr"/>
           <a:lstStyle>
-            <a:lvl1pPr algn="l">
+            <a:lvl1pPr algn="ctr" defTabSz="3762024" fontAlgn="auto">
+              <a:spcBef>
+                <a:spcPts val="0"/>
+              </a:spcBef>
+              <a:spcAft>
+                <a:spcPts val="0"/>
+              </a:spcAft>
               <a:defRPr sz="4900">
                 <a:solidFill>
                   <a:schemeClr val="tx1">
                     <a:tint val="75000"/>
                   </a:schemeClr>
                 </a:solidFill>
+                <a:latin typeface="+mn-lt"/>
               </a:defRPr>
             </a:lvl1pPr>
           </a:lstStyle>
           <a:p>
-            <a:fld id="{1C1D3833-2B13-464A-BD94-E3167CFC0F67}" type="datetimeFigureOut">
-              <a:rPr lang="en-US" smtClean="0"/>
-              <a:pPr/>
-              <a:t>4/13/2011</a:t>
-            </a:fld>
-            <a:endParaRPr lang="en-US"/>
-          </a:p>
-        </p:txBody>
-      </p:sp>
-      <p:sp>
-        <p:nvSpPr>
-          <p:cNvPr id="5" name="Footer Placeholder 4"/>
-          <p:cNvSpPr>
-            <a:spLocks noGrp="1"/>
-          </p:cNvSpPr>
-          <p:nvPr>
-            <p:ph type="ftr" sz="quarter" idx="3"/>
+            <a:pPr>
+              <a:defRPr/>
+            </a:pPr>
+            <a:endParaRPr lang="en-US"/>
+          </a:p>
+        </p:txBody>
+      </p:sp>
+      <p:sp>
+        <p:nvSpPr>
+          <p:cNvPr id="6" name="Slide Number Placeholder 5"/>
+          <p:cNvSpPr>
+            <a:spLocks noGrp="1"/>
+          </p:cNvSpPr>
+          <p:nvPr>
+            <p:ph type="sldNum" sz="quarter" idx="4"/>
           </p:nvPr>
         </p:nvSpPr>
         <p:spPr>
           <a:xfrm>
-            <a:off x="12496800" y="27120429"/>
-            <a:ext cx="11582400" cy="1557867"/>
+            <a:off x="26212800" y="27120850"/>
+            <a:ext cx="8534400" cy="1557338"/>
           </a:xfrm>
           <a:prstGeom prst="rect">
             <a:avLst/>
@@ -2716,57 +3100,32 @@
         <p:txBody>
           <a:bodyPr vert="horz" lIns="376202" tIns="188101" rIns="376202" bIns="188101" rtlCol="0" anchor="ctr"/>
           <a:lstStyle>
-            <a:lvl1pPr algn="ctr">
-              <a:defRPr sz="4900">
+            <a:lvl1pPr algn="r" defTabSz="3762024" fontAlgn="auto">
+              <a:spcBef>
+                <a:spcPts val="0"/>
+              </a:spcBef>
+              <a:spcAft>
+                <a:spcPts val="0"/>
+              </a:spcAft>
+              <a:defRPr sz="4900" smtClean="0">
                 <a:solidFill>
                   <a:schemeClr val="tx1">
                     <a:tint val="75000"/>
                   </a:schemeClr>
                 </a:solidFill>
+                <a:latin typeface="+mn-lt"/>
               </a:defRPr>
             </a:lvl1pPr>
           </a:lstStyle>
           <a:p>
-            <a:endParaRPr lang="en-US"/>
-          </a:p>
-        </p:txBody>
-      </p:sp>
-      <p:sp>
-        <p:nvSpPr>
-          <p:cNvPr id="6" name="Slide Number Placeholder 5"/>
-          <p:cNvSpPr>
-            <a:spLocks noGrp="1"/>
-          </p:cNvSpPr>
-          <p:nvPr>
-            <p:ph type="sldNum" sz="quarter" idx="4"/>
-          </p:nvPr>
-        </p:nvSpPr>
-        <p:spPr>
-          <a:xfrm>
-            <a:off x="26212800" y="27120429"/>
-            <a:ext cx="8534400" cy="1557867"/>
-          </a:xfrm>
-          <a:prstGeom prst="rect">
-            <a:avLst/>
-          </a:prstGeom>
-        </p:spPr>
-        <p:txBody>
-          <a:bodyPr vert="horz" lIns="376202" tIns="188101" rIns="376202" bIns="188101" rtlCol="0" anchor="ctr"/>
-          <a:lstStyle>
-            <a:lvl1pPr algn="r">
-              <a:defRPr sz="4900">
-                <a:solidFill>
-                  <a:schemeClr val="tx1">
-                    <a:tint val="75000"/>
-                  </a:schemeClr>
-                </a:solidFill>
-              </a:defRPr>
-            </a:lvl1pPr>
-          </a:lstStyle>
-          <a:p>
-            <a:fld id="{153C754B-F51C-49DF-8C65-A0BCDDAA7DC5}" type="slidenum">
-              <a:rPr lang="en-US" smtClean="0"/>
-              <a:pPr/>
+            <a:pPr>
+              <a:defRPr/>
+            </a:pPr>
+            <a:fld id="{DFB76E11-268A-4735-88EE-5BB1E19C3E81}" type="slidenum">
+              <a:rPr lang="en-US"/>
+              <a:pPr>
+                <a:defRPr/>
+              </a:pPr>
               <a:t>‹#›</a:t>
             </a:fld>
             <a:endParaRPr lang="en-US"/>
@@ -2777,25 +3136,27 @@
   </p:cSld>
   <p:clrMap bg1="lt1" tx1="dk1" bg2="lt2" tx2="dk2" accent1="accent1" accent2="accent2" accent3="accent3" accent4="accent4" accent5="accent5" accent6="accent6" hlink="hlink" folHlink="folHlink"/>
   <p:sldLayoutIdLst>
-    <p:sldLayoutId id="2147483721" r:id="rId1"/>
-    <p:sldLayoutId id="2147483722" r:id="rId2"/>
-    <p:sldLayoutId id="2147483723" r:id="rId3"/>
-    <p:sldLayoutId id="2147483724" r:id="rId4"/>
-    <p:sldLayoutId id="2147483725" r:id="rId5"/>
+    <p:sldLayoutId id="2147483731" r:id="rId1"/>
+    <p:sldLayoutId id="2147483730" r:id="rId2"/>
+    <p:sldLayoutId id="2147483729" r:id="rId3"/>
+    <p:sldLayoutId id="2147483728" r:id="rId4"/>
+    <p:sldLayoutId id="2147483727" r:id="rId5"/>
     <p:sldLayoutId id="2147483726" r:id="rId6"/>
-    <p:sldLayoutId id="2147483727" r:id="rId7"/>
-    <p:sldLayoutId id="2147483728" r:id="rId8"/>
-    <p:sldLayoutId id="2147483729" r:id="rId9"/>
-    <p:sldLayoutId id="2147483730" r:id="rId10"/>
-    <p:sldLayoutId id="2147483731" r:id="rId11"/>
+    <p:sldLayoutId id="2147483725" r:id="rId7"/>
+    <p:sldLayoutId id="2147483724" r:id="rId8"/>
+    <p:sldLayoutId id="2147483723" r:id="rId9"/>
+    <p:sldLayoutId id="2147483722" r:id="rId10"/>
+    <p:sldLayoutId id="2147483721" r:id="rId11"/>
   </p:sldLayoutIdLst>
   <p:txStyles>
     <p:titleStyle>
-      <a:lvl1pPr algn="ctr" defTabSz="3762024" rtl="0" eaLnBrk="1" latinLnBrk="0" hangingPunct="1">
+      <a:lvl1pPr algn="ctr" defTabSz="3760788" rtl="0" fontAlgn="base">
         <a:spcBef>
           <a:spcPct val="0"/>
         </a:spcBef>
-        <a:buNone/>
+        <a:spcAft>
+          <a:spcPct val="0"/>
+        </a:spcAft>
         <a:defRPr sz="18100" kern="1200">
           <a:solidFill>
             <a:schemeClr val="tx1"/>
@@ -2805,13 +3166,128 @@
           <a:cs typeface="+mj-cs"/>
         </a:defRPr>
       </a:lvl1pPr>
+      <a:lvl2pPr algn="ctr" defTabSz="3760788" rtl="0" fontAlgn="base">
+        <a:spcBef>
+          <a:spcPct val="0"/>
+        </a:spcBef>
+        <a:spcAft>
+          <a:spcPct val="0"/>
+        </a:spcAft>
+        <a:defRPr sz="18100">
+          <a:solidFill>
+            <a:schemeClr val="tx1"/>
+          </a:solidFill>
+          <a:latin typeface="Calibri" pitchFamily="34" charset="0"/>
+        </a:defRPr>
+      </a:lvl2pPr>
+      <a:lvl3pPr algn="ctr" defTabSz="3760788" rtl="0" fontAlgn="base">
+        <a:spcBef>
+          <a:spcPct val="0"/>
+        </a:spcBef>
+        <a:spcAft>
+          <a:spcPct val="0"/>
+        </a:spcAft>
+        <a:defRPr sz="18100">
+          <a:solidFill>
+            <a:schemeClr val="tx1"/>
+          </a:solidFill>
+          <a:latin typeface="Calibri" pitchFamily="34" charset="0"/>
+        </a:defRPr>
+      </a:lvl3pPr>
+      <a:lvl4pPr algn="ctr" defTabSz="3760788" rtl="0" fontAlgn="base">
+        <a:spcBef>
+          <a:spcPct val="0"/>
+        </a:spcBef>
+        <a:spcAft>
+          <a:spcPct val="0"/>
+        </a:spcAft>
+        <a:defRPr sz="18100">
+          <a:solidFill>
+            <a:schemeClr val="tx1"/>
+          </a:solidFill>
+          <a:latin typeface="Calibri" pitchFamily="34" charset="0"/>
+        </a:defRPr>
+      </a:lvl4pPr>
+      <a:lvl5pPr algn="ctr" defTabSz="3760788" rtl="0" fontAlgn="base">
+        <a:spcBef>
+          <a:spcPct val="0"/>
+        </a:spcBef>
+        <a:spcAft>
+          <a:spcPct val="0"/>
+        </a:spcAft>
+        <a:defRPr sz="18100">
+          <a:solidFill>
+            <a:schemeClr val="tx1"/>
+          </a:solidFill>
+          <a:latin typeface="Calibri" pitchFamily="34" charset="0"/>
+        </a:defRPr>
+      </a:lvl5pPr>
+      <a:lvl6pPr marL="457200" algn="ctr" defTabSz="3760788" rtl="0" fontAlgn="base">
+        <a:spcBef>
+          <a:spcPct val="0"/>
+        </a:spcBef>
+        <a:spcAft>
+          <a:spcPct val="0"/>
+        </a:spcAft>
+        <a:defRPr sz="18100">
+          <a:solidFill>
+            <a:schemeClr val="tx1"/>
+          </a:solidFill>
+          <a:latin typeface="Calibri" pitchFamily="34" charset="0"/>
+        </a:defRPr>
+      </a:lvl6pPr>
+      <a:lvl7pPr marL="914400" algn="ctr" defTabSz="3760788" rtl="0" fontAlgn="base">
+        <a:spcBef>
+          <a:spcPct val="0"/>
+        </a:spcBef>
+        <a:spcAft>
+          <a:spcPct val="0"/>
+        </a:spcAft>
+        <a:defRPr sz="18100">
+          <a:solidFill>
+            <a:schemeClr val="tx1"/>
+          </a:solidFill>
+          <a:latin typeface="Calibri" pitchFamily="34" charset="0"/>
+        </a:defRPr>
+      </a:lvl7pPr>
+      <a:lvl8pPr marL="1371600" algn="ctr" defTabSz="3760788" rtl="0" fontAlgn="base">
+        <a:spcBef>
+          <a:spcPct val="0"/>
+        </a:spcBef>
+        <a:spcAft>
+          <a:spcPct val="0"/>
+        </a:spcAft>
+        <a:defRPr sz="18100">
+          <a:solidFill>
+            <a:schemeClr val="tx1"/>
+          </a:solidFill>
+          <a:latin typeface="Calibri" pitchFamily="34" charset="0"/>
+        </a:defRPr>
+      </a:lvl8pPr>
+      <a:lvl9pPr marL="1828800" algn="ctr" defTabSz="3760788" rtl="0" fontAlgn="base">
+        <a:spcBef>
+          <a:spcPct val="0"/>
+        </a:spcBef>
+        <a:spcAft>
+          <a:spcPct val="0"/>
+        </a:spcAft>
+        <a:defRPr sz="18100">
+          <a:solidFill>
+            <a:schemeClr val="tx1"/>
+          </a:solidFill>
+          <a:latin typeface="Calibri" pitchFamily="34" charset="0"/>
+        </a:defRPr>
+      </a:lvl9pPr>
     </p:titleStyle>
     <p:bodyStyle>
-      <a:lvl1pPr marL="1410759" indent="-1410759" algn="l" defTabSz="3762024" rtl="0" eaLnBrk="1" latinLnBrk="0" hangingPunct="1">
+      <a:lvl1pPr marL="1409700" indent="-1409700" algn="l" defTabSz="3760788" rtl="0" fontAlgn="base">
         <a:spcBef>
           <a:spcPct val="20000"/>
         </a:spcBef>
-        <a:buFont typeface="Arial" pitchFamily="34" charset="0"/>
+        <a:spcAft>
+          <a:spcPct val="0"/>
+        </a:spcAft>
+        <a:buFont typeface="Arial" charset="0"/>
         <a:buChar char="•"/>
         <a:defRPr sz="13200" kern="1200">
           <a:solidFill>
@@ -2822,11 +3298,14 @@
           <a:cs typeface="+mn-cs"/>
         </a:defRPr>
       </a:lvl1pPr>
-      <a:lvl2pPr marL="3056645" indent="-1175633" algn="l" defTabSz="3762024" rtl="0" eaLnBrk="1" latinLnBrk="0" hangingPunct="1">
+      <a:lvl2pPr marL="3055938" indent="-1174750" algn="l" defTabSz="3760788" rtl="0" fontAlgn="base">
         <a:spcBef>
           <a:spcPct val="20000"/>
         </a:spcBef>
-        <a:buFont typeface="Arial" pitchFamily="34" charset="0"/>
+        <a:spcAft>
+          <a:spcPct val="0"/>
+        </a:spcAft>
+        <a:buFont typeface="Arial" charset="0"/>
         <a:buChar char="–"/>
         <a:defRPr sz="11500" kern="1200">
           <a:solidFill>
@@ -2837,11 +3316,14 @@
           <a:cs typeface="+mn-cs"/>
         </a:defRPr>
       </a:lvl2pPr>
-      <a:lvl3pPr marL="4702531" indent="-940506" algn="l" defTabSz="3762024" rtl="0" eaLnBrk="1" latinLnBrk="0" hangingPunct="1">
+      <a:lvl3pPr marL="4702175" indent="-939800" algn="l" defTabSz="3760788" rtl="0" fontAlgn="base">
         <a:spcBef>
           <a:spcPct val="20000"/>
         </a:spcBef>
-        <a:buFont typeface="Arial" pitchFamily="34" charset="0"/>
+        <a:spcAft>
+          <a:spcPct val="0"/>
+        </a:spcAft>
+        <a:buFont typeface="Arial" charset="0"/>
         <a:buChar char="•"/>
         <a:defRPr sz="9900" kern="1200">
           <a:solidFill>
@@ -2852,11 +3334,14 @@
           <a:cs typeface="+mn-cs"/>
         </a:defRPr>
       </a:lvl3pPr>
-      <a:lvl4pPr marL="6583543" indent="-940506" algn="l" defTabSz="3762024" rtl="0" eaLnBrk="1" latinLnBrk="0" hangingPunct="1">
+      <a:lvl4pPr marL="6583363" indent="-939800" algn="l" defTabSz="3760788" rtl="0" fontAlgn="base">
         <a:spcBef>
           <a:spcPct val="20000"/>
         </a:spcBef>
-        <a:buFont typeface="Arial" pitchFamily="34" charset="0"/>
+        <a:spcAft>
+          <a:spcPct val="0"/>
+        </a:spcAft>
+        <a:buFont typeface="Arial" charset="0"/>
         <a:buChar char="–"/>
         <a:defRPr sz="8200" kern="1200">
           <a:solidFill>
@@ -2867,11 +3352,14 @@
           <a:cs typeface="+mn-cs"/>
         </a:defRPr>
       </a:lvl4pPr>
-      <a:lvl5pPr marL="8464555" indent="-940506" algn="l" defTabSz="3762024" rtl="0" eaLnBrk="1" latinLnBrk="0" hangingPunct="1">
+      <a:lvl5pPr marL="8464550" indent="-939800" algn="l" defTabSz="3760788" rtl="0" fontAlgn="base">
         <a:spcBef>
           <a:spcPct val="20000"/>
         </a:spcBef>
-        <a:buFont typeface="Arial" pitchFamily="34" charset="0"/>
+        <a:spcAft>
+          <a:spcPct val="0"/>
+        </a:spcAft>
+        <a:buFont typeface="Arial" charset="0"/>
         <a:buChar char="»"/>
         <a:defRPr sz="8200" kern="1200">
           <a:solidFill>
@@ -3061,7 +3549,7 @@
       </p:grpSpPr>
       <p:pic>
         <p:nvPicPr>
-          <p:cNvPr id="13" name="Picture 12" descr="f18.jpg"/>
+          <p:cNvPr id="13313" name="Picture 12" descr="f18.jpg"/>
           <p:cNvPicPr>
             <a:picLocks noChangeAspect="1"/>
           </p:cNvPicPr>
@@ -3069,11 +3557,12 @@
         </p:nvPicPr>
         <p:blipFill>
           <a:blip r:embed="rId2" cstate="print"/>
+          <a:srcRect/>
           <a:stretch>
             <a:fillRect/>
           </a:stretch>
         </p:blipFill>
-        <p:spPr>
+        <p:spPr bwMode="auto">
           <a:xfrm>
             <a:off x="0" y="0"/>
             <a:ext cx="36576000" cy="29260800"/>
@@ -3081,6 +3570,13 @@
           <a:prstGeom prst="rect">
             <a:avLst/>
           </a:prstGeom>
+          <a:noFill/>
+          <a:ln w="9525">
+            <a:noFill/>
+            <a:miter lim="800000"/>
+            <a:headEnd/>
+            <a:tailEnd/>
+          </a:ln>
         </p:spPr>
       </p:pic>
       <p:sp>
@@ -3095,16 +3591,22 @@
         </p:nvSpPr>
         <p:spPr>
           <a:xfrm>
-            <a:off x="0" y="2"/>
-            <a:ext cx="36576000" cy="2926076"/>
+            <a:off x="0" y="0"/>
+            <a:ext cx="36576000" cy="2925763"/>
           </a:xfrm>
         </p:spPr>
         <p:txBody>
-          <a:bodyPr>
+          <a:bodyPr rtlCol="0">
             <a:normAutofit fontScale="90000"/>
           </a:bodyPr>
           <a:lstStyle/>
           <a:p>
+            <a:pPr defTabSz="3762024" fontAlgn="auto">
+              <a:spcAft>
+                <a:spcPts val="0"/>
+              </a:spcAft>
+              <a:defRPr/>
+            </a:pPr>
             <a:r>
               <a:rPr lang="en-US" dirty="0" smtClean="0"/>
               <a:t>Company Management System</a:t>
@@ -3125,550 +3627,459 @@
         </p:nvSpPr>
         <p:spPr>
           <a:xfrm>
-            <a:off x="12801600" y="3576320"/>
-            <a:ext cx="10668000" cy="5201920"/>
+            <a:off x="12801600" y="3576638"/>
+            <a:ext cx="10668000" cy="5202237"/>
           </a:xfrm>
         </p:spPr>
         <p:txBody>
           <a:bodyPr>
-            <a:normAutofit fontScale="92500" lnSpcReduction="20000"/>
+            <a:normAutofit/>
           </a:bodyPr>
           <a:lstStyle/>
           <a:p>
-            <a:r>
-              <a:rPr lang="en-US" sz="5800" dirty="0" smtClean="0">
+            <a:pPr>
+              <a:lnSpc>
+                <a:spcPct val="80000"/>
+              </a:lnSpc>
+            </a:pPr>
+            <a:r>
+              <a:rPr lang="en-US" sz="5400" smtClean="0">
                 <a:solidFill>
                   <a:schemeClr val="tx1"/>
                 </a:solidFill>
               </a:rPr>
               <a:t>Michael Laws</a:t>
             </a:r>
-            <a:endParaRPr lang="en-US" sz="5800" dirty="0">
-              <a:solidFill>
-                <a:schemeClr val="tx1"/>
-              </a:solidFill>
-            </a:endParaRPr>
-          </a:p>
-          <a:p>
-            <a:r>
-              <a:rPr lang="en-US" sz="5800" dirty="0" smtClean="0">
+          </a:p>
+          <a:p>
+            <a:pPr>
+              <a:lnSpc>
+                <a:spcPct val="80000"/>
+              </a:lnSpc>
+            </a:pPr>
+            <a:r>
+              <a:rPr lang="en-US" sz="5400" smtClean="0">
                 <a:solidFill>
                   <a:schemeClr val="tx1"/>
                 </a:solidFill>
               </a:rPr>
               <a:t>Michael Harrison</a:t>
             </a:r>
-            <a:endParaRPr lang="en-US" sz="5800" dirty="0">
+          </a:p>
+          <a:p>
+            <a:pPr>
+              <a:lnSpc>
+                <a:spcPct val="80000"/>
+              </a:lnSpc>
+            </a:pPr>
+            <a:r>
+              <a:rPr lang="en-US" sz="5400" smtClean="0">
+                <a:solidFill>
+                  <a:schemeClr val="tx1"/>
+                </a:solidFill>
+              </a:rPr>
+              <a:t>Ryan Rabe</a:t>
+            </a:r>
+          </a:p>
+          <a:p>
+            <a:pPr>
+              <a:lnSpc>
+                <a:spcPct val="80000"/>
+              </a:lnSpc>
+            </a:pPr>
+            <a:r>
+              <a:rPr lang="en-US" sz="5400" smtClean="0">
+                <a:solidFill>
+                  <a:schemeClr val="tx1"/>
+                </a:solidFill>
+              </a:rPr>
+              <a:t>Dimitri Hatley</a:t>
+            </a:r>
+          </a:p>
+          <a:p>
+            <a:pPr>
+              <a:lnSpc>
+                <a:spcPct val="80000"/>
+              </a:lnSpc>
+            </a:pPr>
+            <a:r>
+              <a:rPr lang="en-US" sz="5400" smtClean="0">
+                <a:solidFill>
+                  <a:schemeClr val="tx1"/>
+                </a:solidFill>
+              </a:rPr>
+              <a:t>Topical Areas: Web, Database, Middleware, OOP, Frameworks</a:t>
+            </a:r>
+            <a:endParaRPr lang="en-US" sz="12200" smtClean="0">
               <a:solidFill>
                 <a:schemeClr val="tx1"/>
               </a:solidFill>
             </a:endParaRPr>
           </a:p>
-          <a:p>
-            <a:r>
-              <a:rPr lang="en-US" sz="5800" dirty="0" smtClean="0">
-                <a:solidFill>
-                  <a:schemeClr val="tx1"/>
-                </a:solidFill>
-              </a:rPr>
-              <a:t>Ryan </a:t>
-            </a:r>
-            <a:r>
-              <a:rPr lang="en-US" sz="5800" dirty="0" err="1" smtClean="0">
-                <a:solidFill>
-                  <a:schemeClr val="tx1"/>
-                </a:solidFill>
-              </a:rPr>
-              <a:t>Rabe</a:t>
-            </a:r>
-            <a:endParaRPr lang="en-US" sz="5800" dirty="0" smtClean="0">
-              <a:solidFill>
-                <a:schemeClr val="tx1"/>
-              </a:solidFill>
-            </a:endParaRPr>
-          </a:p>
-          <a:p>
-            <a:r>
-              <a:rPr lang="en-US" sz="5800" dirty="0" err="1" smtClean="0">
-                <a:solidFill>
-                  <a:schemeClr val="tx1"/>
-                </a:solidFill>
-              </a:rPr>
-              <a:t>Dimitri</a:t>
-            </a:r>
-            <a:r>
-              <a:rPr lang="en-US" sz="5800" dirty="0" smtClean="0">
-                <a:solidFill>
-                  <a:schemeClr val="tx1"/>
-                </a:solidFill>
-              </a:rPr>
-              <a:t> </a:t>
-            </a:r>
-            <a:r>
-              <a:rPr lang="en-US" sz="5800" dirty="0" err="1" smtClean="0">
-                <a:solidFill>
-                  <a:schemeClr val="tx1"/>
-                </a:solidFill>
-              </a:rPr>
-              <a:t>Hatley</a:t>
-            </a:r>
-            <a:endParaRPr lang="en-US" sz="5800" dirty="0" smtClean="0">
-              <a:solidFill>
-                <a:schemeClr val="tx1"/>
-              </a:solidFill>
-            </a:endParaRPr>
-          </a:p>
-          <a:p>
-            <a:r>
-              <a:rPr lang="en-US" sz="5800" dirty="0" smtClean="0">
-                <a:solidFill>
-                  <a:schemeClr val="tx1"/>
-                </a:solidFill>
-              </a:rPr>
-              <a:t>Topical Areas: Web, Database, Middleware</a:t>
-            </a:r>
-          </a:p>
-          <a:p>
-            <a:endParaRPr lang="en-US" sz="6600" dirty="0">
-              <a:solidFill>
-                <a:schemeClr val="tx1"/>
-              </a:solidFill>
-            </a:endParaRPr>
-          </a:p>
-          <a:p>
-            <a:endParaRPr lang="en-US" sz="6600" dirty="0">
-              <a:solidFill>
-                <a:schemeClr val="tx1"/>
-              </a:solidFill>
-            </a:endParaRPr>
-          </a:p>
-          <a:p>
-            <a:endParaRPr lang="en-US" dirty="0">
-              <a:solidFill>
-                <a:schemeClr val="tx1"/>
-              </a:solidFill>
-            </a:endParaRPr>
-          </a:p>
-        </p:txBody>
-      </p:sp>
-      <p:sp>
-        <p:nvSpPr>
-          <p:cNvPr id="4" name="Subtitle 2"/>
+        </p:txBody>
+      </p:sp>
+      <p:sp>
+        <p:nvSpPr>
+          <p:cNvPr id="13316" name="Subtitle 2"/>
           <p:cNvSpPr txBox="1">
             <a:spLocks/>
           </p:cNvSpPr>
           <p:nvPr/>
         </p:nvSpPr>
-        <p:spPr>
+        <p:spPr bwMode="auto">
           <a:xfrm>
-            <a:off x="0" y="2275840"/>
-            <a:ext cx="36576000" cy="7477760"/>
-          </a:xfrm>
-          <a:prstGeom prst="rect">
-            <a:avLst/>
-          </a:prstGeom>
-        </p:spPr>
-        <p:txBody>
-          <a:bodyPr vert="horz" lIns="376202" tIns="188101" rIns="376202" bIns="188101" rtlCol="0">
-            <a:normAutofit/>
-          </a:bodyPr>
-          <a:lstStyle/>
-          <a:p>
-            <a:pPr algn="ctr">
-              <a:spcBef>
-                <a:spcPct val="20000"/>
-              </a:spcBef>
-            </a:pPr>
-            <a:r>
-              <a:rPr lang="en-US" sz="8200" dirty="0" smtClean="0"/>
-              <a:t>Team Name: </a:t>
-            </a:r>
-            <a:r>
-              <a:rPr lang="en-US" sz="8200" dirty="0" smtClean="0"/>
-              <a:t>Team1</a:t>
-            </a:r>
-            <a:endParaRPr lang="en-US" sz="6600" dirty="0"/>
-          </a:p>
-          <a:p>
-            <a:pPr>
-              <a:spcBef>
-                <a:spcPct val="20000"/>
-              </a:spcBef>
-            </a:pPr>
-            <a:endParaRPr lang="en-US" sz="6600" dirty="0"/>
-          </a:p>
-          <a:p>
-            <a:pPr algn="ctr">
-              <a:spcBef>
-                <a:spcPct val="20000"/>
-              </a:spcBef>
-            </a:pPr>
-            <a:endParaRPr lang="en-US" sz="13200" dirty="0"/>
-          </a:p>
-        </p:txBody>
-      </p:sp>
-      <p:sp>
-        <p:nvSpPr>
-          <p:cNvPr id="5" name="TextBox 4"/>
-          <p:cNvSpPr txBox="1"/>
-          <p:nvPr/>
-        </p:nvSpPr>
-        <p:spPr>
-          <a:xfrm>
-            <a:off x="685800" y="6248400"/>
-            <a:ext cx="12192000" cy="3349920"/>
+            <a:off x="0" y="2276475"/>
+            <a:ext cx="36576000" cy="7477125"/>
           </a:xfrm>
           <a:prstGeom prst="rect">
             <a:avLst/>
           </a:prstGeom>
           <a:noFill/>
+          <a:ln w="9525">
+            <a:noFill/>
+            <a:miter lim="800000"/>
+            <a:headEnd/>
+            <a:tailEnd/>
+          </a:ln>
         </p:spPr>
         <p:txBody>
-          <a:bodyPr wrap="square" lIns="376202" tIns="188101" rIns="376202" bIns="188101" rtlCol="0">
-            <a:spAutoFit/>
-          </a:bodyPr>
+          <a:bodyPr lIns="376202" tIns="188101" rIns="376202" bIns="188101"/>
           <a:lstStyle/>
           <a:p>
-            <a:r>
-              <a:rPr lang="en-US" sz="5800" b="1" dirty="0"/>
-              <a:t>OVERVIEW: </a:t>
-            </a:r>
-            <a:r>
-              <a:rPr lang="en-US" sz="4500" dirty="0"/>
-              <a:t>We </a:t>
-            </a:r>
-            <a:r>
-              <a:rPr lang="en-US" sz="4500" dirty="0" smtClean="0"/>
-              <a:t>produced </a:t>
-            </a:r>
-            <a:r>
-              <a:rPr lang="en-US" sz="4500" dirty="0"/>
-              <a:t>a GUI </a:t>
-            </a:r>
-            <a:r>
-              <a:rPr lang="en-US" sz="4500" dirty="0" smtClean="0"/>
-              <a:t>accessed secure </a:t>
-            </a:r>
-            <a:r>
-              <a:rPr lang="en-US" sz="4500" dirty="0"/>
-              <a:t>database in order to assist aviation squadrons in the production of flight schedules and maintaining pilot’s qualifications and logs. </a:t>
-            </a:r>
-          </a:p>
-        </p:txBody>
-      </p:sp>
-      <p:sp>
-        <p:nvSpPr>
-          <p:cNvPr id="6" name="TextBox 5"/>
-          <p:cNvSpPr txBox="1"/>
+            <a:pPr algn="ctr">
+              <a:spcBef>
+                <a:spcPct val="20000"/>
+              </a:spcBef>
+            </a:pPr>
+            <a:r>
+              <a:rPr lang="en-US" sz="8200">
+                <a:latin typeface="Calibri" pitchFamily="34" charset="0"/>
+              </a:rPr>
+              <a:t>Team Name: Team1</a:t>
+            </a:r>
+            <a:endParaRPr lang="en-US" sz="6600">
+              <a:latin typeface="Calibri" pitchFamily="34" charset="0"/>
+            </a:endParaRPr>
+          </a:p>
+          <a:p>
+            <a:pPr>
+              <a:spcBef>
+                <a:spcPct val="20000"/>
+              </a:spcBef>
+            </a:pPr>
+            <a:endParaRPr lang="en-US" sz="6600">
+              <a:latin typeface="Calibri" pitchFamily="34" charset="0"/>
+            </a:endParaRPr>
+          </a:p>
+          <a:p>
+            <a:pPr algn="ctr">
+              <a:spcBef>
+                <a:spcPct val="20000"/>
+              </a:spcBef>
+            </a:pPr>
+            <a:endParaRPr lang="en-US" sz="13200">
+              <a:latin typeface="Calibri" pitchFamily="34" charset="0"/>
+            </a:endParaRPr>
+          </a:p>
+        </p:txBody>
+      </p:sp>
+      <p:sp>
+        <p:nvSpPr>
+          <p:cNvPr id="13317" name="TextBox 4"/>
+          <p:cNvSpPr txBox="1">
+            <a:spLocks noChangeArrowheads="1"/>
+          </p:cNvSpPr>
           <p:nvPr/>
         </p:nvSpPr>
-        <p:spPr>
+        <p:spPr bwMode="auto">
           <a:xfrm>
-            <a:off x="24079200" y="6240416"/>
-            <a:ext cx="12268200" cy="10090226"/>
+            <a:off x="609600" y="5029200"/>
+            <a:ext cx="12192000" cy="4002088"/>
           </a:xfrm>
           <a:prstGeom prst="rect">
             <a:avLst/>
           </a:prstGeom>
           <a:noFill/>
+          <a:ln w="9525">
+            <a:noFill/>
+            <a:miter lim="800000"/>
+            <a:headEnd/>
+            <a:tailEnd/>
+          </a:ln>
         </p:spPr>
         <p:txBody>
-          <a:bodyPr wrap="square" lIns="376202" tIns="188101" rIns="376202" bIns="188101" rtlCol="0">
+          <a:bodyPr lIns="376202" tIns="188101" rIns="376202" bIns="188101">
             <a:spAutoFit/>
           </a:bodyPr>
           <a:lstStyle/>
           <a:p>
             <a:r>
-              <a:rPr lang="en-US" sz="6600" b="1" dirty="0" smtClean="0"/>
-              <a:t>CONCLUSIONS:</a:t>
-            </a:r>
-          </a:p>
-          <a:p>
-            <a:endParaRPr lang="en-US" sz="900" b="1" dirty="0" smtClean="0"/>
-          </a:p>
-          <a:p>
-            <a:r>
-              <a:rPr lang="en-US" sz="6600" dirty="0" smtClean="0"/>
-              <a:t> </a:t>
-            </a:r>
-            <a:r>
-              <a:rPr lang="en-US" sz="4900" b="1" dirty="0"/>
-              <a:t>Lessons Learned</a:t>
-            </a:r>
-            <a:r>
-              <a:rPr lang="en-US" sz="4900" b="1" dirty="0" smtClean="0"/>
-              <a:t>:</a:t>
-            </a:r>
-            <a:endParaRPr lang="en-US" sz="4900" dirty="0" smtClean="0"/>
-          </a:p>
-          <a:p>
-            <a:pPr>
-              <a:buFont typeface="Arial" pitchFamily="34" charset="0"/>
-              <a:buChar char="•"/>
-            </a:pPr>
-            <a:r>
-              <a:rPr lang="en-US" sz="4900" dirty="0" smtClean="0"/>
-              <a:t>Project management is actually important</a:t>
-            </a:r>
-          </a:p>
-          <a:p>
-            <a:pPr>
-              <a:buFont typeface="Arial" pitchFamily="34" charset="0"/>
-              <a:buChar char="•"/>
-            </a:pPr>
-            <a:r>
-              <a:rPr lang="en-US" sz="4900" dirty="0" smtClean="0"/>
-              <a:t>Poor Cohesion and coupling impact a system</a:t>
-            </a:r>
-            <a:endParaRPr lang="en-US" sz="4900" dirty="0"/>
-          </a:p>
-          <a:p>
-            <a:pPr>
-              <a:buFont typeface="Arial" pitchFamily="34" charset="0"/>
-              <a:buChar char="•"/>
-            </a:pPr>
-            <a:r>
-              <a:rPr lang="en-US" sz="4900" dirty="0"/>
-              <a:t> </a:t>
-            </a:r>
-            <a:r>
-              <a:rPr lang="en-US" sz="4900" dirty="0" smtClean="0"/>
-              <a:t>Password encryption</a:t>
-            </a:r>
-            <a:endParaRPr lang="en-US" sz="4900" dirty="0"/>
-          </a:p>
-          <a:p>
-            <a:pPr>
-              <a:buFont typeface="Arial" pitchFamily="34" charset="0"/>
-              <a:buChar char="•"/>
-            </a:pPr>
-            <a:r>
-              <a:rPr lang="en-US" sz="4900" dirty="0" smtClean="0"/>
-              <a:t> User-role-based permissions</a:t>
-            </a:r>
-            <a:endParaRPr lang="en-US" sz="4900" dirty="0"/>
-          </a:p>
-          <a:p>
-            <a:pPr>
-              <a:buFont typeface="Arial" pitchFamily="34" charset="0"/>
-              <a:buChar char="•"/>
-            </a:pPr>
-            <a:endParaRPr lang="en-US" sz="4900" dirty="0"/>
-          </a:p>
-          <a:p>
-            <a:r>
-              <a:rPr lang="en-US" sz="4900" b="1" dirty="0"/>
-              <a:t>Mistakes Made:</a:t>
-            </a:r>
-          </a:p>
-          <a:p>
-            <a:pPr>
-              <a:buFont typeface="Arial" pitchFamily="34" charset="0"/>
-              <a:buChar char="•"/>
-            </a:pPr>
-            <a:r>
-              <a:rPr lang="en-US" sz="4900" dirty="0" smtClean="0"/>
-              <a:t>R</a:t>
-            </a:r>
-          </a:p>
-          <a:p>
-            <a:pPr>
-              <a:buFont typeface="Arial" pitchFamily="34" charset="0"/>
-              <a:buChar char="•"/>
-            </a:pPr>
-            <a:endParaRPr lang="en-US" sz="4900" dirty="0"/>
-          </a:p>
-          <a:p>
-            <a:r>
-              <a:rPr lang="en-US" sz="4900" b="1" dirty="0"/>
-              <a:t>Suggestions for the Future: </a:t>
-            </a:r>
-          </a:p>
-          <a:p>
-            <a:pPr>
-              <a:buFont typeface="Arial" pitchFamily="34" charset="0"/>
-              <a:buChar char="•"/>
-            </a:pPr>
-            <a:r>
-              <a:rPr lang="en-US" sz="4900" dirty="0" err="1" smtClean="0"/>
-              <a:t>Dis</a:t>
-            </a:r>
-            <a:endParaRPr lang="en-US" sz="4900" dirty="0"/>
-          </a:p>
-        </p:txBody>
-      </p:sp>
-      <p:sp>
-        <p:nvSpPr>
-          <p:cNvPr id="7" name="TextBox 6"/>
-          <p:cNvSpPr txBox="1"/>
+              <a:rPr lang="en-US" sz="5800" b="1">
+                <a:latin typeface="Calibri" pitchFamily="34" charset="0"/>
+              </a:rPr>
+              <a:t>OVERVIEW: </a:t>
+            </a:r>
+            <a:r>
+              <a:rPr lang="en-US" sz="4500">
+                <a:latin typeface="Calibri" pitchFamily="34" charset="0"/>
+              </a:rPr>
+              <a:t>CMS is a web interfaced, database back ended, modularly designed, system to manage the daily paperwork that a Company of Midshipmen deals with on a daily basis.</a:t>
+            </a:r>
+          </a:p>
+        </p:txBody>
+      </p:sp>
+      <p:sp>
+        <p:nvSpPr>
+          <p:cNvPr id="13318" name="TextBox 5"/>
+          <p:cNvSpPr txBox="1">
+            <a:spLocks noChangeArrowheads="1"/>
+          </p:cNvSpPr>
           <p:nvPr/>
         </p:nvSpPr>
-        <p:spPr>
+        <p:spPr bwMode="auto">
           <a:xfrm>
-            <a:off x="0" y="10425180"/>
-            <a:ext cx="13487400" cy="10382614"/>
+            <a:off x="23774400" y="4953000"/>
+            <a:ext cx="12268200" cy="7747000"/>
           </a:xfrm>
           <a:prstGeom prst="rect">
             <a:avLst/>
           </a:prstGeom>
           <a:noFill/>
+          <a:ln w="9525">
+            <a:noFill/>
+            <a:miter lim="800000"/>
+            <a:headEnd/>
+            <a:tailEnd/>
+          </a:ln>
         </p:spPr>
         <p:txBody>
-          <a:bodyPr wrap="square" lIns="376202" tIns="188101" rIns="376202" bIns="188101" rtlCol="0">
+          <a:bodyPr lIns="376202" tIns="188101" rIns="376202" bIns="188101">
             <a:spAutoFit/>
           </a:bodyPr>
           <a:lstStyle/>
           <a:p>
             <a:r>
-              <a:rPr lang="en-US" sz="6600" b="1" dirty="0">
+              <a:rPr lang="en-US" sz="6600" b="1">
+                <a:latin typeface="Calibri" pitchFamily="34" charset="0"/>
+              </a:rPr>
+              <a:t>CONCLUSIONS:</a:t>
+            </a:r>
+          </a:p>
+          <a:p>
+            <a:endParaRPr lang="en-US" sz="900" b="1">
+              <a:latin typeface="Calibri" pitchFamily="34" charset="0"/>
+            </a:endParaRPr>
+          </a:p>
+          <a:p>
+            <a:r>
+              <a:rPr lang="en-US" sz="6600">
+                <a:latin typeface="Calibri" pitchFamily="34" charset="0"/>
+              </a:rPr>
+              <a:t> </a:t>
+            </a:r>
+            <a:r>
+              <a:rPr lang="en-US" sz="4900" b="1">
+                <a:latin typeface="Calibri" pitchFamily="34" charset="0"/>
+              </a:rPr>
+              <a:t>Lessons Learned:</a:t>
+            </a:r>
+            <a:endParaRPr lang="en-US" sz="4900">
+              <a:latin typeface="Calibri" pitchFamily="34" charset="0"/>
+            </a:endParaRPr>
+          </a:p>
+          <a:p>
+            <a:pPr>
+              <a:buFont typeface="Arial" charset="0"/>
+              <a:buChar char="•"/>
+            </a:pPr>
+            <a:r>
+              <a:rPr lang="en-US" sz="4900">
+                <a:latin typeface="Calibri" pitchFamily="34" charset="0"/>
+              </a:rPr>
+              <a:t>Simple problems may have complicated solutions.</a:t>
+            </a:r>
+          </a:p>
+          <a:p>
+            <a:pPr>
+              <a:buFont typeface="Arial" charset="0"/>
+              <a:buChar char="•"/>
+            </a:pPr>
+            <a:r>
+              <a:rPr lang="en-US" sz="4900">
+                <a:latin typeface="Calibri" pitchFamily="34" charset="0"/>
+              </a:rPr>
+              <a:t>Good team communication is as important as good code.</a:t>
+            </a:r>
+          </a:p>
+          <a:p>
+            <a:pPr>
+              <a:buFont typeface="Arial" charset="0"/>
+              <a:buChar char="•"/>
+            </a:pPr>
+            <a:r>
+              <a:rPr lang="en-US" sz="4900">
                 <a:solidFill>
                   <a:schemeClr val="bg1"/>
                 </a:solidFill>
+                <a:latin typeface="Calibri" pitchFamily="34" charset="0"/>
+              </a:rPr>
+              <a:t>A framework to aid development may or may not be a good idea depending on the application.</a:t>
+            </a:r>
+          </a:p>
+        </p:txBody>
+      </p:sp>
+      <p:sp>
+        <p:nvSpPr>
+          <p:cNvPr id="7" name="TextBox 6"/>
+          <p:cNvSpPr txBox="1">
+            <a:spLocks noChangeArrowheads="1"/>
+          </p:cNvSpPr>
+          <p:nvPr/>
+        </p:nvSpPr>
+        <p:spPr bwMode="auto">
+          <a:xfrm>
+            <a:off x="0" y="9220200"/>
+            <a:ext cx="13487400" cy="12573000"/>
+          </a:xfrm>
+          <a:prstGeom prst="rect">
+            <a:avLst/>
+          </a:prstGeom>
+          <a:solidFill>
+            <a:schemeClr val="bg1"/>
+          </a:solidFill>
+          <a:ln w="9525">
+            <a:noFill/>
+            <a:miter lim="800000"/>
+            <a:headEnd/>
+            <a:tailEnd/>
+          </a:ln>
+        </p:spPr>
+        <p:txBody>
+          <a:bodyPr lIns="376202" tIns="188101" rIns="376202" bIns="188101">
+            <a:spAutoFit/>
+          </a:bodyPr>
+          <a:lstStyle/>
+          <a:p>
+            <a:r>
+              <a:rPr lang="en-US" sz="6600" b="1">
+                <a:latin typeface="Calibri" pitchFamily="34" charset="0"/>
               </a:rPr>
               <a:t>Top 3 challenges:</a:t>
             </a:r>
           </a:p>
           <a:p>
-            <a:pPr marL="940506" indent="-940506">
+            <a:pPr>
+              <a:buFontTx/>
               <a:buAutoNum type="arabicPeriod"/>
             </a:pPr>
             <a:r>
-              <a:rPr lang="en-US" sz="4900" b="1" dirty="0" err="1" smtClean="0">
-                <a:solidFill>
-                  <a:schemeClr val="bg1"/>
-                </a:solidFill>
+              <a:rPr lang="en-US" sz="4900" b="1">
+                <a:latin typeface="Calibri" pitchFamily="34" charset="0"/>
               </a:rPr>
-              <a:t>Logd</a:t>
-            </a:r>
-            <a:endParaRPr lang="en-US" sz="4900" b="1" dirty="0" smtClean="0">
-              <a:solidFill>
-                <a:schemeClr val="bg1"/>
-              </a:solidFill>
-            </a:endParaRPr>
-          </a:p>
-          <a:p>
-            <a:pPr marL="940506" indent="-940506">
+              <a:t> Complexity Management</a:t>
+            </a:r>
+          </a:p>
+          <a:p>
+            <a:pPr marL="2820988" lvl="1" indent="-939800">
+              <a:buFontTx/>
+              <a:buChar char="•"/>
+            </a:pPr>
+            <a:r>
+              <a:rPr lang="en-US" sz="4900">
+                <a:latin typeface="Calibri" pitchFamily="34" charset="0"/>
+              </a:rPr>
+              <a:t>Many MIDN data points to keep track of and reference</a:t>
+            </a:r>
+          </a:p>
+          <a:p>
+            <a:pPr marL="2820988" lvl="1" indent="-939800">
+              <a:buFontTx/>
+              <a:buChar char="•"/>
+            </a:pPr>
+            <a:r>
+              <a:rPr lang="en-US" sz="4900">
+                <a:latin typeface="Calibri" pitchFamily="34" charset="0"/>
+              </a:rPr>
+              <a:t>SOLUTION: Use the Django framework to aid in design and development</a:t>
+            </a:r>
+          </a:p>
+          <a:p>
+            <a:pPr>
+              <a:buFontTx/>
               <a:buAutoNum type="arabicPeriod"/>
             </a:pPr>
             <a:r>
-              <a:rPr lang="en-US" sz="4900" b="1" dirty="0" err="1" smtClean="0">
-                <a:solidFill>
-                  <a:schemeClr val="bg1"/>
-                </a:solidFill>
+              <a:rPr lang="en-US" sz="4900" b="1">
+                <a:latin typeface="Calibri" pitchFamily="34" charset="0"/>
               </a:rPr>
-              <a:t>Asdf</a:t>
-            </a:r>
-            <a:endParaRPr lang="en-US" sz="4900" b="1" dirty="0" smtClean="0">
-              <a:solidFill>
-                <a:schemeClr val="bg1"/>
-              </a:solidFill>
-            </a:endParaRPr>
-          </a:p>
-          <a:p>
-            <a:pPr marL="940506" indent="-940506">
+              <a:t> Team coordination and cohesion</a:t>
+            </a:r>
+          </a:p>
+          <a:p>
+            <a:pPr marL="2820988" lvl="1" indent="-939800">
+              <a:buFontTx/>
+              <a:buChar char="•"/>
+            </a:pPr>
+            <a:r>
+              <a:rPr lang="en-US" sz="4900">
+                <a:latin typeface="Calibri" pitchFamily="34" charset="0"/>
+              </a:rPr>
+              <a:t>Dynamic projects require active communication</a:t>
+            </a:r>
+          </a:p>
+          <a:p>
+            <a:pPr marL="2820988" lvl="1" indent="-939800">
+              <a:buFontTx/>
+              <a:buChar char="•"/>
+            </a:pPr>
+            <a:r>
+              <a:rPr lang="en-US" sz="4900">
+                <a:latin typeface="Calibri" pitchFamily="34" charset="0"/>
+              </a:rPr>
+              <a:t>SOLUTION: External server based solutions for code storage and execution</a:t>
+            </a:r>
+          </a:p>
+          <a:p>
+            <a:pPr>
+              <a:buFontTx/>
               <a:buAutoNum type="arabicPeriod"/>
             </a:pPr>
             <a:r>
-              <a:rPr lang="en-US" sz="4900" b="1" dirty="0" err="1" smtClean="0">
-                <a:solidFill>
-                  <a:schemeClr val="bg1"/>
-                </a:solidFill>
+              <a:rPr lang="en-US" sz="4900" b="1">
+                <a:latin typeface="Calibri" pitchFamily="34" charset="0"/>
               </a:rPr>
-              <a:t>Df</a:t>
-            </a:r>
-            <a:endParaRPr lang="en-US" sz="4900" b="1" dirty="0" smtClean="0">
-              <a:solidFill>
-                <a:schemeClr val="bg1"/>
-              </a:solidFill>
-            </a:endParaRPr>
-          </a:p>
-          <a:p>
-            <a:pPr marL="940506" indent="-940506">
-              <a:buAutoNum type="arabicPeriod"/>
-            </a:pPr>
-            <a:endParaRPr lang="en-US" sz="4900" dirty="0">
-              <a:solidFill>
-                <a:schemeClr val="bg1"/>
-              </a:solidFill>
-            </a:endParaRPr>
-          </a:p>
-          <a:p>
-            <a:pPr marL="940506" indent="-940506">
-              <a:buAutoNum type="arabicPeriod" startAt="2"/>
-            </a:pPr>
-            <a:endParaRPr lang="en-US" sz="4500" dirty="0">
-              <a:solidFill>
-                <a:schemeClr val="bg1"/>
-              </a:solidFill>
-            </a:endParaRPr>
-          </a:p>
-          <a:p>
-            <a:pPr marL="2821518" lvl="1" indent="-940506"/>
-            <a:endParaRPr lang="en-US" sz="4900" dirty="0">
-              <a:solidFill>
-                <a:schemeClr val="bg1"/>
-              </a:solidFill>
-            </a:endParaRPr>
-          </a:p>
-          <a:p>
-            <a:pPr marL="2821518" lvl="1" indent="-940506">
-              <a:buFont typeface="Arial" pitchFamily="34" charset="0"/>
+              <a:t> Learning a new framework and language</a:t>
+            </a:r>
+          </a:p>
+          <a:p>
+            <a:pPr marL="2820988" lvl="1" indent="-939800">
+              <a:buFontTx/>
               <a:buChar char="•"/>
             </a:pPr>
-            <a:endParaRPr lang="en-US" sz="4900" dirty="0">
-              <a:solidFill>
-                <a:schemeClr val="bg1"/>
-              </a:solidFill>
-            </a:endParaRPr>
-          </a:p>
-          <a:p>
-            <a:pPr>
-              <a:buFont typeface="Arial" pitchFamily="34" charset="0"/>
+            <a:r>
+              <a:rPr lang="en-US" sz="4900">
+                <a:latin typeface="Calibri" pitchFamily="34" charset="0"/>
+              </a:rPr>
+              <a:t>We had to learn the language python and the framework Django</a:t>
+            </a:r>
+          </a:p>
+          <a:p>
+            <a:pPr marL="2820988" lvl="1" indent="-939800">
+              <a:buFontTx/>
               <a:buChar char="•"/>
             </a:pPr>
-            <a:endParaRPr lang="en-US" sz="4900" dirty="0">
-              <a:solidFill>
-                <a:schemeClr val="bg1"/>
-              </a:solidFill>
-            </a:endParaRPr>
-          </a:p>
-          <a:p>
-            <a:pPr lvl="1"/>
-            <a:endParaRPr lang="en-US" sz="4900" dirty="0">
-              <a:solidFill>
-                <a:schemeClr val="bg1"/>
-              </a:solidFill>
-            </a:endParaRPr>
-          </a:p>
-          <a:p>
-            <a:pPr lvl="1"/>
-            <a:endParaRPr lang="en-US" sz="4900" dirty="0">
-              <a:solidFill>
-                <a:schemeClr val="bg1"/>
-              </a:solidFill>
-            </a:endParaRPr>
-          </a:p>
-          <a:p>
-            <a:pPr lvl="1"/>
-            <a:endParaRPr lang="en-US" sz="4900" dirty="0">
-              <a:solidFill>
-                <a:schemeClr val="bg1"/>
-              </a:solidFill>
-            </a:endParaRPr>
-          </a:p>
-          <a:p>
-            <a:pPr lvl="1"/>
-            <a:endParaRPr lang="en-US" sz="4900" dirty="0">
-              <a:solidFill>
-                <a:schemeClr val="bg1"/>
-              </a:solidFill>
-            </a:endParaRPr>
+            <a:r>
+              <a:rPr lang="en-US" sz="4900">
+                <a:latin typeface="Calibri" pitchFamily="34" charset="0"/>
+              </a:rPr>
+              <a:t>SOLUTION: Time and effort.</a:t>
+            </a:r>
           </a:p>
         </p:txBody>
       </p:sp>
       <p:pic>
         <p:nvPicPr>
-          <p:cNvPr id="16" name="Picture 15" descr="crest1.png"/>
+          <p:cNvPr id="13320" name="Picture 15" descr="crest1.png"/>
           <p:cNvPicPr>
             <a:picLocks noChangeAspect="1"/>
           </p:cNvPicPr>
@@ -3676,23 +4087,31 @@
         </p:nvPicPr>
         <p:blipFill>
           <a:blip r:embed="rId3" cstate="print"/>
+          <a:srcRect/>
           <a:stretch>
             <a:fillRect/>
           </a:stretch>
         </p:blipFill>
-        <p:spPr>
+        <p:spPr bwMode="auto">
           <a:xfrm>
-            <a:off x="1219200" y="0"/>
-            <a:ext cx="3143916" cy="4495800"/>
+            <a:off x="1143000" y="457200"/>
+            <a:ext cx="3143250" cy="4495800"/>
           </a:xfrm>
           <a:prstGeom prst="rect">
             <a:avLst/>
           </a:prstGeom>
+          <a:noFill/>
+          <a:ln w="9525">
+            <a:noFill/>
+            <a:miter lim="800000"/>
+            <a:headEnd/>
+            <a:tailEnd/>
+          </a:ln>
         </p:spPr>
       </p:pic>
       <p:pic>
         <p:nvPicPr>
-          <p:cNvPr id="17" name="Picture 10" descr="Z:\Pictures\Department Poster Pics\FinalCSLogo\CS-Logo-final-small.png"/>
+          <p:cNvPr id="13321" name="Picture 10" descr="Z:\Pictures\Department Poster Pics\FinalCSLogo\CS-Logo-final-small.png"/>
           <p:cNvPicPr>
             <a:picLocks noChangeAspect="1" noChangeArrowheads="1"/>
           </p:cNvPicPr>
@@ -3707,8 +4126,40 @@
         </p:blipFill>
         <p:spPr bwMode="auto">
           <a:xfrm>
-            <a:off x="32004000" y="0"/>
-            <a:ext cx="3693508" cy="3711975"/>
+            <a:off x="31927800" y="381000"/>
+            <a:ext cx="3694113" cy="3711575"/>
+          </a:xfrm>
+          <a:prstGeom prst="rect">
+            <a:avLst/>
+          </a:prstGeom>
+          <a:noFill/>
+          <a:ln w="9525">
+            <a:noFill/>
+            <a:miter lim="800000"/>
+            <a:headEnd/>
+            <a:tailEnd/>
+          </a:ln>
+        </p:spPr>
+      </p:pic>
+      <p:pic>
+        <p:nvPicPr>
+          <p:cNvPr id="13323" name="Picture 11" descr="public view 1"/>
+          <p:cNvPicPr>
+            <a:picLocks noChangeAspect="1" noChangeArrowheads="1"/>
+          </p:cNvPicPr>
+          <p:nvPr/>
+        </p:nvPicPr>
+        <p:blipFill>
+          <a:blip r:embed="rId5" cstate="print"/>
+          <a:srcRect/>
+          <a:stretch>
+            <a:fillRect/>
+          </a:stretch>
+        </p:blipFill>
+        <p:spPr bwMode="auto">
+          <a:xfrm>
+            <a:off x="609600" y="22860000"/>
+            <a:ext cx="14554200" cy="3978275"/>
           </a:xfrm>
           <a:prstGeom prst="rect">
             <a:avLst/>
@@ -3716,6 +4167,207 @@
           <a:noFill/>
         </p:spPr>
       </p:pic>
+      <p:sp>
+        <p:nvSpPr>
+          <p:cNvPr id="13324" name="TextBox 9"/>
+          <p:cNvSpPr txBox="1">
+            <a:spLocks noChangeArrowheads="1"/>
+          </p:cNvSpPr>
+          <p:nvPr/>
+        </p:nvSpPr>
+        <p:spPr bwMode="auto">
+          <a:xfrm>
+            <a:off x="2362200" y="27127200"/>
+            <a:ext cx="11658600" cy="1000125"/>
+          </a:xfrm>
+          <a:prstGeom prst="rect">
+            <a:avLst/>
+          </a:prstGeom>
+          <a:noFill/>
+          <a:ln w="9525">
+            <a:noFill/>
+            <a:miter lim="800000"/>
+            <a:headEnd/>
+            <a:tailEnd/>
+          </a:ln>
+        </p:spPr>
+        <p:txBody>
+          <a:bodyPr lIns="376202" tIns="188101" rIns="376202" bIns="188101">
+            <a:spAutoFit/>
+          </a:bodyPr>
+          <a:lstStyle/>
+          <a:p>
+            <a:r>
+              <a:rPr lang="en-US" sz="4100">
+                <a:solidFill>
+                  <a:schemeClr val="bg1"/>
+                </a:solidFill>
+                <a:latin typeface="Calibri" pitchFamily="34" charset="0"/>
+              </a:rPr>
+              <a:t>Ex1: screen capture of the dynamic navigation bar</a:t>
+            </a:r>
+          </a:p>
+        </p:txBody>
+      </p:sp>
+      <p:sp>
+        <p:nvSpPr>
+          <p:cNvPr id="13325" name="Text Box 13"/>
+          <p:cNvSpPr txBox="1">
+            <a:spLocks noChangeArrowheads="1"/>
+          </p:cNvSpPr>
+          <p:nvPr/>
+        </p:nvSpPr>
+        <p:spPr bwMode="auto">
+          <a:xfrm>
+            <a:off x="13487400" y="9220200"/>
+            <a:ext cx="10226675" cy="7327900"/>
+          </a:xfrm>
+          <a:prstGeom prst="rect">
+            <a:avLst/>
+          </a:prstGeom>
+          <a:solidFill>
+            <a:schemeClr val="bg1"/>
+          </a:solidFill>
+          <a:ln w="9525">
+            <a:noFill/>
+            <a:miter lim="800000"/>
+            <a:headEnd/>
+            <a:tailEnd/>
+          </a:ln>
+          <a:effectLst/>
+        </p:spPr>
+        <p:txBody>
+          <a:bodyPr>
+            <a:spAutoFit/>
+          </a:bodyPr>
+          <a:lstStyle/>
+          <a:p>
+            <a:pPr defTabSz="914400"/>
+            <a:r>
+              <a:rPr lang="en-US" sz="6600" b="1">
+                <a:latin typeface="Calibri" pitchFamily="34" charset="0"/>
+              </a:rPr>
+              <a:t>Mistakes Made:</a:t>
+            </a:r>
+          </a:p>
+          <a:p>
+            <a:pPr defTabSz="914400">
+              <a:buFontTx/>
+              <a:buChar char="•"/>
+            </a:pPr>
+            <a:r>
+              <a:rPr lang="en-US" sz="4900">
+                <a:latin typeface="Calibri" pitchFamily="34" charset="0"/>
+              </a:rPr>
+              <a:t>Did not fully solidify requirements before coding</a:t>
+            </a:r>
+          </a:p>
+          <a:p>
+            <a:pPr defTabSz="914400">
+              <a:buFontTx/>
+              <a:buChar char="•"/>
+            </a:pPr>
+            <a:r>
+              <a:rPr lang="en-US" sz="4900">
+                <a:latin typeface="Calibri" pitchFamily="34" charset="0"/>
+              </a:rPr>
+              <a:t>Did not fully learn the potential or quirks of Django before coding</a:t>
+            </a:r>
+          </a:p>
+          <a:p>
+            <a:pPr defTabSz="914400"/>
+            <a:r>
+              <a:rPr lang="en-US" sz="6600" b="1">
+                <a:latin typeface="Calibri" pitchFamily="34" charset="0"/>
+              </a:rPr>
+              <a:t>Suggestions for the Future:</a:t>
+            </a:r>
+          </a:p>
+          <a:p>
+            <a:pPr defTabSz="914400">
+              <a:buFontTx/>
+              <a:buChar char="•"/>
+            </a:pPr>
+            <a:r>
+              <a:rPr lang="en-US" sz="4900">
+                <a:latin typeface="Calibri" pitchFamily="34" charset="0"/>
+              </a:rPr>
+              <a:t>Spend time fully learning the languages and frameworks and their internal systems before using them</a:t>
+            </a:r>
+          </a:p>
+        </p:txBody>
+      </p:sp>
+      <p:pic>
+        <p:nvPicPr>
+          <p:cNvPr id="13327" name="Picture 15" descr="public view 3"/>
+          <p:cNvPicPr>
+            <a:picLocks noChangeAspect="1" noChangeArrowheads="1"/>
+          </p:cNvPicPr>
+          <p:nvPr/>
+        </p:nvPicPr>
+        <p:blipFill>
+          <a:blip r:embed="rId6" cstate="print"/>
+          <a:srcRect/>
+          <a:stretch>
+            <a:fillRect/>
+          </a:stretch>
+        </p:blipFill>
+        <p:spPr bwMode="auto">
+          <a:xfrm>
+            <a:off x="18516600" y="16611600"/>
+            <a:ext cx="14478000" cy="11091863"/>
+          </a:xfrm>
+          <a:prstGeom prst="rect">
+            <a:avLst/>
+          </a:prstGeom>
+          <a:noFill/>
+        </p:spPr>
+      </p:pic>
+      <p:sp>
+        <p:nvSpPr>
+          <p:cNvPr id="13328" name="Text Box 16"/>
+          <p:cNvSpPr txBox="1">
+            <a:spLocks noChangeArrowheads="1"/>
+          </p:cNvSpPr>
+          <p:nvPr/>
+        </p:nvSpPr>
+        <p:spPr bwMode="auto">
+          <a:xfrm>
+            <a:off x="18669000" y="28041600"/>
+            <a:ext cx="14181138" cy="717550"/>
+          </a:xfrm>
+          <a:prstGeom prst="rect">
+            <a:avLst/>
+          </a:prstGeom>
+          <a:noFill/>
+          <a:ln w="9525">
+            <a:noFill/>
+            <a:miter lim="800000"/>
+            <a:headEnd/>
+            <a:tailEnd/>
+          </a:ln>
+          <a:effectLst/>
+        </p:spPr>
+        <p:txBody>
+          <a:bodyPr wrap="none">
+            <a:spAutoFit/>
+          </a:bodyPr>
+          <a:lstStyle/>
+          <a:p>
+            <a:pPr defTabSz="914400"/>
+            <a:r>
+              <a:rPr lang="en-US" sz="4100">
+                <a:solidFill>
+                  <a:schemeClr val="bg1"/>
+                </a:solidFill>
+                <a:latin typeface="Calibri" pitchFamily="34" charset="0"/>
+              </a:rPr>
+              <a:t>Ex2: screen capture of the dynamic ORM chit with popup calendar</a:t>
+            </a:r>
+            <a:endParaRPr lang="en-US"/>
+          </a:p>
+        </p:txBody>
+      </p:sp>
     </p:spTree>
   </p:cSld>
   <p:clrMapOvr>

</xml_diff>